<commit_message>
Agrego Diagrama de las Tecnologías de Arquitectura
</commit_message>
<xml_diff>
--- a/Documentacion/Plataforma para Gestion de Eventos Universitarios.pptx
+++ b/Documentacion/Plataforma para Gestion de Eventos Universitarios.pptx
@@ -5,28 +5,29 @@
     <p:sldMasterId id="2147483648" r:id="rId1"/>
   </p:sldMasterIdLst>
   <p:notesMasterIdLst>
-    <p:notesMasterId r:id="rId10"/>
+    <p:notesMasterId r:id="rId11"/>
   </p:notesMasterIdLst>
   <p:sldIdLst>
     <p:sldId id="256" r:id="rId2"/>
     <p:sldId id="257" r:id="rId3"/>
     <p:sldId id="258" r:id="rId4"/>
-    <p:sldId id="259" r:id="rId5"/>
-    <p:sldId id="260" r:id="rId6"/>
-    <p:sldId id="261" r:id="rId7"/>
-    <p:sldId id="262" r:id="rId8"/>
-    <p:sldId id="263" r:id="rId9"/>
+    <p:sldId id="264" r:id="rId5"/>
+    <p:sldId id="259" r:id="rId6"/>
+    <p:sldId id="260" r:id="rId7"/>
+    <p:sldId id="261" r:id="rId8"/>
+    <p:sldId id="262" r:id="rId9"/>
+    <p:sldId id="263" r:id="rId10"/>
   </p:sldIdLst>
   <p:sldSz cx="14630400" cy="8229600"/>
   <p:notesSz cx="8229600" cy="14630400"/>
   <p:embeddedFontLst>
     <p:embeddedFont>
-      <p:font typeface="DM Sans Medium" pitchFamily="2" charset="0"/>
-      <p:regular r:id="rId11"/>
+      <p:font typeface="DM Sans Medium" panose="020F0502020204030204" pitchFamily="2" charset="0"/>
+      <p:regular r:id="rId12"/>
     </p:embeddedFont>
     <p:embeddedFont>
       <p:font typeface="Inter" panose="020B0604020202020204" charset="0"/>
-      <p:regular r:id="rId12"/>
+      <p:regular r:id="rId13"/>
     </p:embeddedFont>
   </p:embeddedFontLst>
   <p:defaultTextStyle>
@@ -514,7 +515,13 @@
   <p:cSld>
     <p:spTree>
       <p:nvGrpSpPr>
-        <p:cNvPr id="1" name=""/>
+        <p:cNvPr id="1" name="">
+          <a:extLst>
+            <a:ext uri="{FF2B5EF4-FFF2-40B4-BE49-F238E27FC236}">
+              <a16:creationId xmlns:a16="http://schemas.microsoft.com/office/drawing/2014/main" id="{CED0A88A-3A34-99D3-F05C-CCBDD198453B}"/>
+            </a:ext>
+          </a:extLst>
+        </p:cNvPr>
         <p:cNvGrpSpPr/>
         <p:nvPr/>
       </p:nvGrpSpPr>
@@ -528,7 +535,13 @@
       </p:grpSpPr>
       <p:sp>
         <p:nvSpPr>
-          <p:cNvPr id="2" name="Slide Image Placeholder 1"/>
+          <p:cNvPr id="2" name="Slide Image Placeholder 1">
+            <a:extLst>
+              <a:ext uri="{FF2B5EF4-FFF2-40B4-BE49-F238E27FC236}">
+                <a16:creationId xmlns:a16="http://schemas.microsoft.com/office/drawing/2014/main" id="{8EA4826D-DFB8-FB94-5762-59112E599094}"/>
+              </a:ext>
+            </a:extLst>
+          </p:cNvPr>
           <p:cNvSpPr>
             <a:spLocks noGrp="1" noRot="1" noChangeAspect="1"/>
           </p:cNvSpPr>
@@ -540,7 +553,13 @@
       </p:sp>
       <p:sp>
         <p:nvSpPr>
-          <p:cNvPr id="3" name="Notes Placeholder 2"/>
+          <p:cNvPr id="3" name="Notes Placeholder 2">
+            <a:extLst>
+              <a:ext uri="{FF2B5EF4-FFF2-40B4-BE49-F238E27FC236}">
+                <a16:creationId xmlns:a16="http://schemas.microsoft.com/office/drawing/2014/main" id="{8F4F9A1D-F4AD-3E25-94CC-29D42CC184B1}"/>
+              </a:ext>
+            </a:extLst>
+          </p:cNvPr>
           <p:cNvSpPr>
             <a:spLocks noGrp="1"/>
           </p:cNvSpPr>
@@ -559,7 +578,13 @@
       </p:sp>
       <p:sp>
         <p:nvSpPr>
-          <p:cNvPr id="4" name="Slide Number Placeholder 3"/>
+          <p:cNvPr id="4" name="Slide Number Placeholder 3">
+            <a:extLst>
+              <a:ext uri="{FF2B5EF4-FFF2-40B4-BE49-F238E27FC236}">
+                <a16:creationId xmlns:a16="http://schemas.microsoft.com/office/drawing/2014/main" id="{CA4C8A77-D538-88C9-F741-85EFCC59D1D7}"/>
+              </a:ext>
+            </a:extLst>
+          </p:cNvPr>
           <p:cNvSpPr>
             <a:spLocks noGrp="1"/>
           </p:cNvSpPr>
@@ -583,7 +608,7 @@
     </p:spTree>
     <p:extLst>
       <p:ext uri="{BB962C8B-B14F-4D97-AF65-F5344CB8AC3E}">
-        <p14:creationId xmlns:p14="http://schemas.microsoft.com/office/powerpoint/2010/main" val="1024086991"/>
+        <p14:creationId xmlns:p14="http://schemas.microsoft.com/office/powerpoint/2010/main" val="3294107497"/>
       </p:ext>
     </p:extLst>
   </p:cSld>
@@ -911,6 +936,90 @@
             <a:fld id="{F7021451-1387-4CA6-816F-3879F97B5CBC}" type="slidenum">
               <a:rPr lang="en-US"/>
               <a:t>8</a:t>
+            </a:fld>
+            <a:endParaRPr lang="en-US"/>
+          </a:p>
+        </p:txBody>
+      </p:sp>
+    </p:spTree>
+    <p:extLst>
+      <p:ext uri="{BB962C8B-B14F-4D97-AF65-F5344CB8AC3E}">
+        <p14:creationId xmlns:p14="http://schemas.microsoft.com/office/powerpoint/2010/main" val="1024086991"/>
+      </p:ext>
+    </p:extLst>
+  </p:cSld>
+  <p:clrMapOvr>
+    <a:masterClrMapping/>
+  </p:clrMapOvr>
+</p:notes>
+</file>
+
+<file path=ppt/notesSlides/notesSlide9.xml><?xml version="1.0" encoding="utf-8"?>
+<p:notes xmlns:a="http://schemas.openxmlformats.org/drawingml/2006/main" xmlns:r="http://schemas.openxmlformats.org/officeDocument/2006/relationships" xmlns:p="http://schemas.openxmlformats.org/presentationml/2006/main">
+  <p:cSld>
+    <p:spTree>
+      <p:nvGrpSpPr>
+        <p:cNvPr id="1" name=""/>
+        <p:cNvGrpSpPr/>
+        <p:nvPr/>
+      </p:nvGrpSpPr>
+      <p:grpSpPr>
+        <a:xfrm>
+          <a:off x="0" y="0"/>
+          <a:ext cx="0" cy="0"/>
+          <a:chOff x="0" y="0"/>
+          <a:chExt cx="0" cy="0"/>
+        </a:xfrm>
+      </p:grpSpPr>
+      <p:sp>
+        <p:nvSpPr>
+          <p:cNvPr id="2" name="Slide Image Placeholder 1"/>
+          <p:cNvSpPr>
+            <a:spLocks noGrp="1" noRot="1" noChangeAspect="1"/>
+          </p:cNvSpPr>
+          <p:nvPr>
+            <p:ph type="sldImg"/>
+          </p:nvPr>
+        </p:nvSpPr>
+        <p:spPr/>
+      </p:sp>
+      <p:sp>
+        <p:nvSpPr>
+          <p:cNvPr id="3" name="Notes Placeholder 2"/>
+          <p:cNvSpPr>
+            <a:spLocks noGrp="1"/>
+          </p:cNvSpPr>
+          <p:nvPr>
+            <p:ph type="body" idx="1"/>
+          </p:nvPr>
+        </p:nvSpPr>
+        <p:spPr/>
+        <p:txBody>
+          <a:bodyPr/>
+          <a:lstStyle/>
+          <a:p>
+            <a:endParaRPr lang="en-US" dirty="0"/>
+          </a:p>
+        </p:txBody>
+      </p:sp>
+      <p:sp>
+        <p:nvSpPr>
+          <p:cNvPr id="4" name="Slide Number Placeholder 3"/>
+          <p:cNvSpPr>
+            <a:spLocks noGrp="1"/>
+          </p:cNvSpPr>
+          <p:nvPr>
+            <p:ph type="sldNum" sz="quarter" idx="10"/>
+          </p:nvPr>
+        </p:nvSpPr>
+        <p:spPr/>
+        <p:txBody>
+          <a:bodyPr/>
+          <a:lstStyle/>
+          <a:p>
+            <a:fld id="{F7021451-1387-4CA6-816F-3879F97B5CBC}" type="slidenum">
+              <a:rPr lang="en-US"/>
+              <a:t>9</a:t>
             </a:fld>
             <a:endParaRPr lang="en-US"/>
           </a:p>
@@ -2808,10 +2917,16 @@
 
 <file path=ppt/slides/slide4.xml><?xml version="1.0" encoding="utf-8"?>
 <p:sld xmlns:a="http://schemas.openxmlformats.org/drawingml/2006/main" xmlns:r="http://schemas.openxmlformats.org/officeDocument/2006/relationships" xmlns:p="http://schemas.openxmlformats.org/presentationml/2006/main">
-  <p:cSld name="Slide 4">
+  <p:cSld>
     <p:spTree>
       <p:nvGrpSpPr>
-        <p:cNvPr id="1" name=""/>
+        <p:cNvPr id="1" name="">
+          <a:extLst>
+            <a:ext uri="{FF2B5EF4-FFF2-40B4-BE49-F238E27FC236}">
+              <a16:creationId xmlns:a16="http://schemas.microsoft.com/office/drawing/2014/main" id="{61FE0A2F-151D-817F-4591-8F02E7D684A5}"/>
+            </a:ext>
+          </a:extLst>
+        </p:cNvPr>
         <p:cNvGrpSpPr/>
         <p:nvPr/>
       </p:nvGrpSpPr>
@@ -2825,7 +2940,13 @@
       </p:grpSpPr>
       <p:pic>
         <p:nvPicPr>
-          <p:cNvPr id="2" name="Image 0" descr="preencoded.png"/>
+          <p:cNvPr id="2" name="Image 0" descr="preencoded.png">
+            <a:extLst>
+              <a:ext uri="{FF2B5EF4-FFF2-40B4-BE49-F238E27FC236}">
+                <a16:creationId xmlns:a16="http://schemas.microsoft.com/office/drawing/2014/main" id="{06DFD035-277C-D83B-0DEF-66FF109467E4}"/>
+              </a:ext>
+            </a:extLst>
+          </p:cNvPr>
           <p:cNvPicPr>
             <a:picLocks noChangeAspect="1"/>
           </p:cNvPicPr>
@@ -2849,7 +2970,13 @@
       </p:pic>
       <p:sp>
         <p:nvSpPr>
-          <p:cNvPr id="3" name="Text 0"/>
+          <p:cNvPr id="3" name="Text 0">
+            <a:extLst>
+              <a:ext uri="{FF2B5EF4-FFF2-40B4-BE49-F238E27FC236}">
+                <a16:creationId xmlns:a16="http://schemas.microsoft.com/office/drawing/2014/main" id="{CAA18F81-3C0C-A8ED-19C5-B9A27945D63E}"/>
+              </a:ext>
+            </a:extLst>
+          </p:cNvPr>
           <p:cNvSpPr/>
           <p:nvPr/>
         </p:nvSpPr>
@@ -2891,7 +3018,13 @@
       </p:sp>
       <p:sp>
         <p:nvSpPr>
-          <p:cNvPr id="4" name="Shape 1"/>
+          <p:cNvPr id="4" name="Shape 1">
+            <a:extLst>
+              <a:ext uri="{FF2B5EF4-FFF2-40B4-BE49-F238E27FC236}">
+                <a16:creationId xmlns:a16="http://schemas.microsoft.com/office/drawing/2014/main" id="{24AEA073-4850-AC3A-7E46-36609EAB792A}"/>
+              </a:ext>
+            </a:extLst>
+          </p:cNvPr>
           <p:cNvSpPr/>
           <p:nvPr/>
         </p:nvSpPr>
@@ -2920,7 +3053,13 @@
       </p:sp>
       <p:sp>
         <p:nvSpPr>
-          <p:cNvPr id="5" name="Text 2"/>
+          <p:cNvPr id="5" name="Text 2">
+            <a:extLst>
+              <a:ext uri="{FF2B5EF4-FFF2-40B4-BE49-F238E27FC236}">
+                <a16:creationId xmlns:a16="http://schemas.microsoft.com/office/drawing/2014/main" id="{8A99989D-56F4-2393-AD5F-09F9D33BCF29}"/>
+              </a:ext>
+            </a:extLst>
+          </p:cNvPr>
           <p:cNvSpPr/>
           <p:nvPr/>
         </p:nvSpPr>
@@ -2962,7 +3101,13 @@
       </p:sp>
       <p:sp>
         <p:nvSpPr>
-          <p:cNvPr id="6" name="Text 3"/>
+          <p:cNvPr id="6" name="Text 3">
+            <a:extLst>
+              <a:ext uri="{FF2B5EF4-FFF2-40B4-BE49-F238E27FC236}">
+                <a16:creationId xmlns:a16="http://schemas.microsoft.com/office/drawing/2014/main" id="{7FFFE5D3-FBF5-EBBB-6B03-87F058ECABCD}"/>
+              </a:ext>
+            </a:extLst>
+          </p:cNvPr>
           <p:cNvSpPr/>
           <p:nvPr/>
         </p:nvSpPr>
@@ -3004,7 +3149,13 @@
       </p:sp>
       <p:sp>
         <p:nvSpPr>
-          <p:cNvPr id="7" name="Text 4"/>
+          <p:cNvPr id="7" name="Text 4">
+            <a:extLst>
+              <a:ext uri="{FF2B5EF4-FFF2-40B4-BE49-F238E27FC236}">
+                <a16:creationId xmlns:a16="http://schemas.microsoft.com/office/drawing/2014/main" id="{4EFE3E98-5D77-B343-76D2-CB93529C95DE}"/>
+              </a:ext>
+            </a:extLst>
+          </p:cNvPr>
           <p:cNvSpPr/>
           <p:nvPr/>
         </p:nvSpPr>
@@ -3046,7 +3197,13 @@
       </p:sp>
       <p:sp>
         <p:nvSpPr>
-          <p:cNvPr id="8" name="Shape 5"/>
+          <p:cNvPr id="8" name="Shape 5">
+            <a:extLst>
+              <a:ext uri="{FF2B5EF4-FFF2-40B4-BE49-F238E27FC236}">
+                <a16:creationId xmlns:a16="http://schemas.microsoft.com/office/drawing/2014/main" id="{3DAB01D7-D55F-1C9A-6374-03EC4DB97484}"/>
+              </a:ext>
+            </a:extLst>
+          </p:cNvPr>
           <p:cNvSpPr/>
           <p:nvPr/>
         </p:nvSpPr>
@@ -3075,7 +3232,13 @@
       </p:sp>
       <p:sp>
         <p:nvSpPr>
-          <p:cNvPr id="9" name="Text 6"/>
+          <p:cNvPr id="9" name="Text 6">
+            <a:extLst>
+              <a:ext uri="{FF2B5EF4-FFF2-40B4-BE49-F238E27FC236}">
+                <a16:creationId xmlns:a16="http://schemas.microsoft.com/office/drawing/2014/main" id="{A830C70A-6735-7E69-36EF-F2E1705515EC}"/>
+              </a:ext>
+            </a:extLst>
+          </p:cNvPr>
           <p:cNvSpPr/>
           <p:nvPr/>
         </p:nvSpPr>
@@ -3117,7 +3280,13 @@
       </p:sp>
       <p:sp>
         <p:nvSpPr>
-          <p:cNvPr id="10" name="Text 7"/>
+          <p:cNvPr id="10" name="Text 7">
+            <a:extLst>
+              <a:ext uri="{FF2B5EF4-FFF2-40B4-BE49-F238E27FC236}">
+                <a16:creationId xmlns:a16="http://schemas.microsoft.com/office/drawing/2014/main" id="{D06A31D7-D37A-6A11-03B1-D021B141C916}"/>
+              </a:ext>
+            </a:extLst>
+          </p:cNvPr>
           <p:cNvSpPr/>
           <p:nvPr/>
         </p:nvSpPr>
@@ -3159,7 +3328,13 @@
       </p:sp>
       <p:sp>
         <p:nvSpPr>
-          <p:cNvPr id="11" name="Text 8"/>
+          <p:cNvPr id="11" name="Text 8">
+            <a:extLst>
+              <a:ext uri="{FF2B5EF4-FFF2-40B4-BE49-F238E27FC236}">
+                <a16:creationId xmlns:a16="http://schemas.microsoft.com/office/drawing/2014/main" id="{2FE20889-8B99-7893-37A5-2FC6EA19A948}"/>
+              </a:ext>
+            </a:extLst>
+          </p:cNvPr>
           <p:cNvSpPr/>
           <p:nvPr/>
         </p:nvSpPr>
@@ -3201,7 +3376,13 @@
       </p:sp>
       <p:sp>
         <p:nvSpPr>
-          <p:cNvPr id="12" name="Shape 9"/>
+          <p:cNvPr id="12" name="Shape 9">
+            <a:extLst>
+              <a:ext uri="{FF2B5EF4-FFF2-40B4-BE49-F238E27FC236}">
+                <a16:creationId xmlns:a16="http://schemas.microsoft.com/office/drawing/2014/main" id="{6B3A2F47-6132-068F-1BD2-4EC558F58EFA}"/>
+              </a:ext>
+            </a:extLst>
+          </p:cNvPr>
           <p:cNvSpPr/>
           <p:nvPr/>
         </p:nvSpPr>
@@ -3230,7 +3411,13 @@
       </p:sp>
       <p:sp>
         <p:nvSpPr>
-          <p:cNvPr id="13" name="Text 10"/>
+          <p:cNvPr id="13" name="Text 10">
+            <a:extLst>
+              <a:ext uri="{FF2B5EF4-FFF2-40B4-BE49-F238E27FC236}">
+                <a16:creationId xmlns:a16="http://schemas.microsoft.com/office/drawing/2014/main" id="{14EBD927-53CA-07B1-0851-C242B8B1AFA4}"/>
+              </a:ext>
+            </a:extLst>
+          </p:cNvPr>
           <p:cNvSpPr/>
           <p:nvPr/>
         </p:nvSpPr>
@@ -3272,7 +3459,13 @@
       </p:sp>
       <p:sp>
         <p:nvSpPr>
-          <p:cNvPr id="14" name="Text 11"/>
+          <p:cNvPr id="14" name="Text 11">
+            <a:extLst>
+              <a:ext uri="{FF2B5EF4-FFF2-40B4-BE49-F238E27FC236}">
+                <a16:creationId xmlns:a16="http://schemas.microsoft.com/office/drawing/2014/main" id="{78311FBE-133F-E531-C7CB-BF41A4097A82}"/>
+              </a:ext>
+            </a:extLst>
+          </p:cNvPr>
           <p:cNvSpPr/>
           <p:nvPr/>
         </p:nvSpPr>
@@ -3314,7 +3507,13 @@
       </p:sp>
       <p:sp>
         <p:nvSpPr>
-          <p:cNvPr id="15" name="Text 12"/>
+          <p:cNvPr id="15" name="Text 12">
+            <a:extLst>
+              <a:ext uri="{FF2B5EF4-FFF2-40B4-BE49-F238E27FC236}">
+                <a16:creationId xmlns:a16="http://schemas.microsoft.com/office/drawing/2014/main" id="{46AB5E09-9613-9C5A-573C-E736E627D83C}"/>
+              </a:ext>
+            </a:extLst>
+          </p:cNvPr>
           <p:cNvSpPr/>
           <p:nvPr/>
         </p:nvSpPr>
@@ -3356,7 +3555,13 @@
       </p:sp>
       <p:sp>
         <p:nvSpPr>
-          <p:cNvPr id="16" name="Shape 13"/>
+          <p:cNvPr id="16" name="Shape 13">
+            <a:extLst>
+              <a:ext uri="{FF2B5EF4-FFF2-40B4-BE49-F238E27FC236}">
+                <a16:creationId xmlns:a16="http://schemas.microsoft.com/office/drawing/2014/main" id="{F83357C1-1BC4-ED59-AE38-72D6BEE69DE4}"/>
+              </a:ext>
+            </a:extLst>
+          </p:cNvPr>
           <p:cNvSpPr/>
           <p:nvPr/>
         </p:nvSpPr>
@@ -3385,7 +3590,13 @@
       </p:sp>
       <p:sp>
         <p:nvSpPr>
-          <p:cNvPr id="17" name="Text 14"/>
+          <p:cNvPr id="17" name="Text 14">
+            <a:extLst>
+              <a:ext uri="{FF2B5EF4-FFF2-40B4-BE49-F238E27FC236}">
+                <a16:creationId xmlns:a16="http://schemas.microsoft.com/office/drawing/2014/main" id="{D134AFBA-1086-1C7D-D1FD-5F7CC97A99D1}"/>
+              </a:ext>
+            </a:extLst>
+          </p:cNvPr>
           <p:cNvSpPr/>
           <p:nvPr/>
         </p:nvSpPr>
@@ -3427,7 +3638,13 @@
       </p:sp>
       <p:sp>
         <p:nvSpPr>
-          <p:cNvPr id="18" name="Text 15"/>
+          <p:cNvPr id="18" name="Text 15">
+            <a:extLst>
+              <a:ext uri="{FF2B5EF4-FFF2-40B4-BE49-F238E27FC236}">
+                <a16:creationId xmlns:a16="http://schemas.microsoft.com/office/drawing/2014/main" id="{6AA13C89-ED34-1AD4-EA29-263C082B70EF}"/>
+              </a:ext>
+            </a:extLst>
+          </p:cNvPr>
           <p:cNvSpPr/>
           <p:nvPr/>
         </p:nvSpPr>
@@ -3469,7 +3686,13 @@
       </p:sp>
       <p:sp>
         <p:nvSpPr>
-          <p:cNvPr id="19" name="Text 16"/>
+          <p:cNvPr id="19" name="Text 16">
+            <a:extLst>
+              <a:ext uri="{FF2B5EF4-FFF2-40B4-BE49-F238E27FC236}">
+                <a16:creationId xmlns:a16="http://schemas.microsoft.com/office/drawing/2014/main" id="{59336904-712F-4CE2-7111-43100B416F6C}"/>
+              </a:ext>
+            </a:extLst>
+          </p:cNvPr>
           <p:cNvSpPr/>
           <p:nvPr/>
         </p:nvSpPr>
@@ -3510,6 +3733,11 @@
         </p:txBody>
       </p:sp>
     </p:spTree>
+    <p:extLst>
+      <p:ext uri="{BB962C8B-B14F-4D97-AF65-F5344CB8AC3E}">
+        <p14:creationId xmlns:p14="http://schemas.microsoft.com/office/powerpoint/2010/main" val="971730288"/>
+      </p:ext>
+    </p:extLst>
   </p:cSld>
   <p:clrMapOvr>
     <a:masterClrMapping/>
@@ -3518,6 +3746,125 @@
 </file>
 
 <file path=ppt/slides/slide5.xml><?xml version="1.0" encoding="utf-8"?>
+<p:sld xmlns:a="http://schemas.openxmlformats.org/drawingml/2006/main" xmlns:r="http://schemas.openxmlformats.org/officeDocument/2006/relationships" xmlns:p="http://schemas.openxmlformats.org/presentationml/2006/main">
+  <p:cSld name="Slide 4">
+    <p:spTree>
+      <p:nvGrpSpPr>
+        <p:cNvPr id="1" name=""/>
+        <p:cNvGrpSpPr/>
+        <p:nvPr/>
+      </p:nvGrpSpPr>
+      <p:grpSpPr>
+        <a:xfrm>
+          <a:off x="0" y="0"/>
+          <a:ext cx="0" cy="0"/>
+          <a:chOff x="0" y="0"/>
+          <a:chExt cx="0" cy="0"/>
+        </a:xfrm>
+      </p:grpSpPr>
+      <p:sp>
+        <p:nvSpPr>
+          <p:cNvPr id="3" name="Text 0"/>
+          <p:cNvSpPr/>
+          <p:nvPr/>
+        </p:nvSpPr>
+        <p:spPr>
+          <a:xfrm>
+            <a:off x="1051135" y="448813"/>
+            <a:ext cx="7666196" cy="1319451"/>
+          </a:xfrm>
+          <a:prstGeom prst="rect">
+            <a:avLst/>
+          </a:prstGeom>
+          <a:noFill/>
+          <a:ln/>
+        </p:spPr>
+        <p:txBody>
+          <a:bodyPr wrap="square" lIns="0" tIns="0" rIns="0" bIns="0" rtlCol="0" anchor="t"/>
+          <a:lstStyle/>
+          <a:p>
+            <a:pPr marL="0" indent="0" algn="l">
+              <a:lnSpc>
+                <a:spcPts val="5150"/>
+              </a:lnSpc>
+              <a:buNone/>
+            </a:pPr>
+            <a:r>
+              <a:rPr lang="en-US" sz="2800" dirty="0" err="1">
+                <a:solidFill>
+                  <a:srgbClr val="161613"/>
+                </a:solidFill>
+                <a:latin typeface="DM Sans Medium" pitchFamily="34" charset="0"/>
+                <a:ea typeface="DM Sans Medium" pitchFamily="34" charset="-122"/>
+                <a:cs typeface="DM Sans Medium" pitchFamily="34" charset="-120"/>
+              </a:rPr>
+              <a:t>Orquestación</a:t>
+            </a:r>
+            <a:r>
+              <a:rPr lang="en-US" sz="2800" dirty="0">
+                <a:solidFill>
+                  <a:srgbClr val="161613"/>
+                </a:solidFill>
+                <a:latin typeface="DM Sans Medium" pitchFamily="34" charset="0"/>
+                <a:ea typeface="DM Sans Medium" pitchFamily="34" charset="-122"/>
+                <a:cs typeface="DM Sans Medium" pitchFamily="34" charset="-120"/>
+              </a:rPr>
+              <a:t> de </a:t>
+            </a:r>
+            <a:r>
+              <a:rPr lang="en-US" sz="2800" dirty="0" err="1">
+                <a:solidFill>
+                  <a:srgbClr val="161613"/>
+                </a:solidFill>
+                <a:latin typeface="DM Sans Medium" pitchFamily="34" charset="0"/>
+                <a:ea typeface="DM Sans Medium" pitchFamily="34" charset="-122"/>
+                <a:cs typeface="DM Sans Medium" pitchFamily="34" charset="-120"/>
+              </a:rPr>
+              <a:t>Tecnologías</a:t>
+            </a:r>
+            <a:endParaRPr lang="en-US" sz="2800" dirty="0"/>
+          </a:p>
+        </p:txBody>
+      </p:sp>
+      <p:pic>
+        <p:nvPicPr>
+          <p:cNvPr id="23" name="Imagen 22">
+            <a:extLst>
+              <a:ext uri="{FF2B5EF4-FFF2-40B4-BE49-F238E27FC236}">
+                <a16:creationId xmlns:a16="http://schemas.microsoft.com/office/drawing/2014/main" id="{97F22261-CF61-B94A-0F6E-BE8C01109E35}"/>
+              </a:ext>
+            </a:extLst>
+          </p:cNvPr>
+          <p:cNvPicPr>
+            <a:picLocks noChangeAspect="1"/>
+          </p:cNvPicPr>
+          <p:nvPr/>
+        </p:nvPicPr>
+        <p:blipFill>
+          <a:blip r:embed="rId3"/>
+          <a:stretch>
+            <a:fillRect/>
+          </a:stretch>
+        </p:blipFill>
+        <p:spPr>
+          <a:xfrm>
+            <a:off x="1051135" y="1108539"/>
+            <a:ext cx="13055157" cy="6933739"/>
+          </a:xfrm>
+          <a:prstGeom prst="rect">
+            <a:avLst/>
+          </a:prstGeom>
+        </p:spPr>
+      </p:pic>
+    </p:spTree>
+  </p:cSld>
+  <p:clrMapOvr>
+    <a:masterClrMapping/>
+  </p:clrMapOvr>
+</p:sld>
+</file>
+
+<file path=ppt/slides/slide6.xml><?xml version="1.0" encoding="utf-8"?>
 <p:sld xmlns:a="http://schemas.openxmlformats.org/drawingml/2006/main" xmlns:r="http://schemas.openxmlformats.org/officeDocument/2006/relationships" xmlns:p="http://schemas.openxmlformats.org/presentationml/2006/main">
   <p:cSld name="Slide 5">
     <p:spTree>
@@ -3842,7 +4189,7 @@
 </p:sld>
 </file>
 
-<file path=ppt/slides/slide6.xml><?xml version="1.0" encoding="utf-8"?>
+<file path=ppt/slides/slide7.xml><?xml version="1.0" encoding="utf-8"?>
 <p:sld xmlns:a="http://schemas.openxmlformats.org/drawingml/2006/main" xmlns:r="http://schemas.openxmlformats.org/officeDocument/2006/relationships" xmlns:p="http://schemas.openxmlformats.org/presentationml/2006/main">
   <p:cSld name="Slide 6">
     <p:spTree>
@@ -4419,7 +4766,7 @@
 </p:sld>
 </file>
 
-<file path=ppt/slides/slide7.xml><?xml version="1.0" encoding="utf-8"?>
+<file path=ppt/slides/slide8.xml><?xml version="1.0" encoding="utf-8"?>
 <p:sld xmlns:a="http://schemas.openxmlformats.org/drawingml/2006/main" xmlns:r="http://schemas.openxmlformats.org/officeDocument/2006/relationships" xmlns:p="http://schemas.openxmlformats.org/presentationml/2006/main">
   <p:cSld name="Slide 7">
     <p:spTree>
@@ -4848,7 +5195,7 @@
 </p:sld>
 </file>
 
-<file path=ppt/slides/slide8.xml><?xml version="1.0" encoding="utf-8"?>
+<file path=ppt/slides/slide9.xml><?xml version="1.0" encoding="utf-8"?>
 <p:sld xmlns:a="http://schemas.openxmlformats.org/drawingml/2006/main" xmlns:r="http://schemas.openxmlformats.org/officeDocument/2006/relationships" xmlns:p="http://schemas.openxmlformats.org/presentationml/2006/main">
   <p:cSld name="Slide 8">
     <p:spTree>

</xml_diff>

<commit_message>
Actualizo diagrama de tecnologías
</commit_message>
<xml_diff>
--- a/Documentacion/Plataforma para Gestion de Eventos Universitarios.pptx
+++ b/Documentacion/Plataforma para Gestion de Eventos Universitarios.pptx
@@ -11,8 +11,8 @@
     <p:sldId id="256" r:id="rId2"/>
     <p:sldId id="257" r:id="rId3"/>
     <p:sldId id="258" r:id="rId4"/>
-    <p:sldId id="264" r:id="rId5"/>
-    <p:sldId id="259" r:id="rId6"/>
+    <p:sldId id="259" r:id="rId5"/>
+    <p:sldId id="264" r:id="rId6"/>
     <p:sldId id="260" r:id="rId7"/>
     <p:sldId id="261" r:id="rId8"/>
     <p:sldId id="262" r:id="rId9"/>
@@ -22,7 +22,7 @@
   <p:notesSz cx="8229600" cy="14630400"/>
   <p:embeddedFontLst>
     <p:embeddedFont>
-      <p:font typeface="DM Sans Medium" panose="020F0502020204030204" pitchFamily="2" charset="0"/>
+      <p:font typeface="DM Sans Medium" pitchFamily="2" charset="0"/>
       <p:regular r:id="rId12"/>
     </p:embeddedFont>
     <p:embeddedFont>
@@ -515,6 +515,90 @@
   <p:cSld>
     <p:spTree>
       <p:nvGrpSpPr>
+        <p:cNvPr id="1" name=""/>
+        <p:cNvGrpSpPr/>
+        <p:nvPr/>
+      </p:nvGrpSpPr>
+      <p:grpSpPr>
+        <a:xfrm>
+          <a:off x="0" y="0"/>
+          <a:ext cx="0" cy="0"/>
+          <a:chOff x="0" y="0"/>
+          <a:chExt cx="0" cy="0"/>
+        </a:xfrm>
+      </p:grpSpPr>
+      <p:sp>
+        <p:nvSpPr>
+          <p:cNvPr id="2" name="Slide Image Placeholder 1"/>
+          <p:cNvSpPr>
+            <a:spLocks noGrp="1" noRot="1" noChangeAspect="1"/>
+          </p:cNvSpPr>
+          <p:nvPr>
+            <p:ph type="sldImg"/>
+          </p:nvPr>
+        </p:nvSpPr>
+        <p:spPr/>
+      </p:sp>
+      <p:sp>
+        <p:nvSpPr>
+          <p:cNvPr id="3" name="Notes Placeholder 2"/>
+          <p:cNvSpPr>
+            <a:spLocks noGrp="1"/>
+          </p:cNvSpPr>
+          <p:nvPr>
+            <p:ph type="body" idx="1"/>
+          </p:nvPr>
+        </p:nvSpPr>
+        <p:spPr/>
+        <p:txBody>
+          <a:bodyPr/>
+          <a:lstStyle/>
+          <a:p>
+            <a:endParaRPr lang="en-US" dirty="0"/>
+          </a:p>
+        </p:txBody>
+      </p:sp>
+      <p:sp>
+        <p:nvSpPr>
+          <p:cNvPr id="4" name="Slide Number Placeholder 3"/>
+          <p:cNvSpPr>
+            <a:spLocks noGrp="1"/>
+          </p:cNvSpPr>
+          <p:nvPr>
+            <p:ph type="sldNum" sz="quarter" idx="10"/>
+          </p:nvPr>
+        </p:nvSpPr>
+        <p:spPr/>
+        <p:txBody>
+          <a:bodyPr/>
+          <a:lstStyle/>
+          <a:p>
+            <a:fld id="{F7021451-1387-4CA6-816F-3879F97B5CBC}" type="slidenum">
+              <a:rPr lang="en-US"/>
+              <a:t>4</a:t>
+            </a:fld>
+            <a:endParaRPr lang="en-US"/>
+          </a:p>
+        </p:txBody>
+      </p:sp>
+    </p:spTree>
+    <p:extLst>
+      <p:ext uri="{BB962C8B-B14F-4D97-AF65-F5344CB8AC3E}">
+        <p14:creationId xmlns:p14="http://schemas.microsoft.com/office/powerpoint/2010/main" val="1024086991"/>
+      </p:ext>
+    </p:extLst>
+  </p:cSld>
+  <p:clrMapOvr>
+    <a:masterClrMapping/>
+  </p:clrMapOvr>
+</p:notes>
+</file>
+
+<file path=ppt/notesSlides/notesSlide5.xml><?xml version="1.0" encoding="utf-8"?>
+<p:notes xmlns:a="http://schemas.openxmlformats.org/drawingml/2006/main" xmlns:r="http://schemas.openxmlformats.org/officeDocument/2006/relationships" xmlns:p="http://schemas.openxmlformats.org/presentationml/2006/main">
+  <p:cSld>
+    <p:spTree>
+      <p:nvGrpSpPr>
         <p:cNvPr id="1" name="">
           <a:extLst>
             <a:ext uri="{FF2B5EF4-FFF2-40B4-BE49-F238E27FC236}">
@@ -599,7 +683,7 @@
           <a:p>
             <a:fld id="{F7021451-1387-4CA6-816F-3879F97B5CBC}" type="slidenum">
               <a:rPr lang="en-US"/>
-              <a:t>4</a:t>
+              <a:t>5</a:t>
             </a:fld>
             <a:endParaRPr lang="en-US"/>
           </a:p>
@@ -609,90 +693,6 @@
     <p:extLst>
       <p:ext uri="{BB962C8B-B14F-4D97-AF65-F5344CB8AC3E}">
         <p14:creationId xmlns:p14="http://schemas.microsoft.com/office/powerpoint/2010/main" val="3294107497"/>
-      </p:ext>
-    </p:extLst>
-  </p:cSld>
-  <p:clrMapOvr>
-    <a:masterClrMapping/>
-  </p:clrMapOvr>
-</p:notes>
-</file>
-
-<file path=ppt/notesSlides/notesSlide5.xml><?xml version="1.0" encoding="utf-8"?>
-<p:notes xmlns:a="http://schemas.openxmlformats.org/drawingml/2006/main" xmlns:r="http://schemas.openxmlformats.org/officeDocument/2006/relationships" xmlns:p="http://schemas.openxmlformats.org/presentationml/2006/main">
-  <p:cSld>
-    <p:spTree>
-      <p:nvGrpSpPr>
-        <p:cNvPr id="1" name=""/>
-        <p:cNvGrpSpPr/>
-        <p:nvPr/>
-      </p:nvGrpSpPr>
-      <p:grpSpPr>
-        <a:xfrm>
-          <a:off x="0" y="0"/>
-          <a:ext cx="0" cy="0"/>
-          <a:chOff x="0" y="0"/>
-          <a:chExt cx="0" cy="0"/>
-        </a:xfrm>
-      </p:grpSpPr>
-      <p:sp>
-        <p:nvSpPr>
-          <p:cNvPr id="2" name="Slide Image Placeholder 1"/>
-          <p:cNvSpPr>
-            <a:spLocks noGrp="1" noRot="1" noChangeAspect="1"/>
-          </p:cNvSpPr>
-          <p:nvPr>
-            <p:ph type="sldImg"/>
-          </p:nvPr>
-        </p:nvSpPr>
-        <p:spPr/>
-      </p:sp>
-      <p:sp>
-        <p:nvSpPr>
-          <p:cNvPr id="3" name="Notes Placeholder 2"/>
-          <p:cNvSpPr>
-            <a:spLocks noGrp="1"/>
-          </p:cNvSpPr>
-          <p:nvPr>
-            <p:ph type="body" idx="1"/>
-          </p:nvPr>
-        </p:nvSpPr>
-        <p:spPr/>
-        <p:txBody>
-          <a:bodyPr/>
-          <a:lstStyle/>
-          <a:p>
-            <a:endParaRPr lang="en-US" dirty="0"/>
-          </a:p>
-        </p:txBody>
-      </p:sp>
-      <p:sp>
-        <p:nvSpPr>
-          <p:cNvPr id="4" name="Slide Number Placeholder 3"/>
-          <p:cNvSpPr>
-            <a:spLocks noGrp="1"/>
-          </p:cNvSpPr>
-          <p:nvPr>
-            <p:ph type="sldNum" sz="quarter" idx="10"/>
-          </p:nvPr>
-        </p:nvSpPr>
-        <p:spPr/>
-        <p:txBody>
-          <a:bodyPr/>
-          <a:lstStyle/>
-          <a:p>
-            <a:fld id="{F7021451-1387-4CA6-816F-3879F97B5CBC}" type="slidenum">
-              <a:rPr lang="en-US"/>
-              <a:t>5</a:t>
-            </a:fld>
-            <a:endParaRPr lang="en-US"/>
-          </a:p>
-        </p:txBody>
-      </p:sp>
-    </p:spTree>
-    <p:extLst>
-      <p:ext uri="{BB962C8B-B14F-4D97-AF65-F5344CB8AC3E}">
-        <p14:creationId xmlns:p14="http://schemas.microsoft.com/office/powerpoint/2010/main" val="1024086991"/>
       </p:ext>
     </p:extLst>
   </p:cSld>
@@ -2917,836 +2917,6 @@
 
 <file path=ppt/slides/slide4.xml><?xml version="1.0" encoding="utf-8"?>
 <p:sld xmlns:a="http://schemas.openxmlformats.org/drawingml/2006/main" xmlns:r="http://schemas.openxmlformats.org/officeDocument/2006/relationships" xmlns:p="http://schemas.openxmlformats.org/presentationml/2006/main">
-  <p:cSld>
-    <p:spTree>
-      <p:nvGrpSpPr>
-        <p:cNvPr id="1" name="">
-          <a:extLst>
-            <a:ext uri="{FF2B5EF4-FFF2-40B4-BE49-F238E27FC236}">
-              <a16:creationId xmlns:a16="http://schemas.microsoft.com/office/drawing/2014/main" id="{61FE0A2F-151D-817F-4591-8F02E7D684A5}"/>
-            </a:ext>
-          </a:extLst>
-        </p:cNvPr>
-        <p:cNvGrpSpPr/>
-        <p:nvPr/>
-      </p:nvGrpSpPr>
-      <p:grpSpPr>
-        <a:xfrm>
-          <a:off x="0" y="0"/>
-          <a:ext cx="0" cy="0"/>
-          <a:chOff x="0" y="0"/>
-          <a:chExt cx="0" cy="0"/>
-        </a:xfrm>
-      </p:grpSpPr>
-      <p:pic>
-        <p:nvPicPr>
-          <p:cNvPr id="2" name="Image 0" descr="preencoded.png">
-            <a:extLst>
-              <a:ext uri="{FF2B5EF4-FFF2-40B4-BE49-F238E27FC236}">
-                <a16:creationId xmlns:a16="http://schemas.microsoft.com/office/drawing/2014/main" id="{06DFD035-277C-D83B-0DEF-66FF109467E4}"/>
-              </a:ext>
-            </a:extLst>
-          </p:cNvPr>
-          <p:cNvPicPr>
-            <a:picLocks noChangeAspect="1"/>
-          </p:cNvPicPr>
-          <p:nvPr/>
-        </p:nvPicPr>
-        <p:blipFill>
-          <a:blip r:embed="rId3"/>
-          <a:stretch>
-            <a:fillRect/>
-          </a:stretch>
-        </p:blipFill>
-        <p:spPr>
-          <a:xfrm>
-            <a:off x="0" y="0"/>
-            <a:ext cx="5486400" cy="8229600"/>
-          </a:xfrm>
-          <a:prstGeom prst="rect">
-            <a:avLst/>
-          </a:prstGeom>
-        </p:spPr>
-      </p:pic>
-      <p:sp>
-        <p:nvSpPr>
-          <p:cNvPr id="3" name="Text 0">
-            <a:extLst>
-              <a:ext uri="{FF2B5EF4-FFF2-40B4-BE49-F238E27FC236}">
-                <a16:creationId xmlns:a16="http://schemas.microsoft.com/office/drawing/2014/main" id="{CAA18F81-3C0C-A8ED-19C5-B9A27945D63E}"/>
-              </a:ext>
-            </a:extLst>
-          </p:cNvPr>
-          <p:cNvSpPr/>
-          <p:nvPr/>
-        </p:nvSpPr>
-        <p:spPr>
-          <a:xfrm>
-            <a:off x="6225302" y="761048"/>
-            <a:ext cx="7666196" cy="1319451"/>
-          </a:xfrm>
-          <a:prstGeom prst="rect">
-            <a:avLst/>
-          </a:prstGeom>
-          <a:noFill/>
-          <a:ln/>
-        </p:spPr>
-        <p:txBody>
-          <a:bodyPr wrap="square" lIns="0" tIns="0" rIns="0" bIns="0" rtlCol="0" anchor="t"/>
-          <a:lstStyle/>
-          <a:p>
-            <a:pPr marL="0" indent="0" algn="l">
-              <a:lnSpc>
-                <a:spcPts val="5150"/>
-              </a:lnSpc>
-              <a:buNone/>
-            </a:pPr>
-            <a:r>
-              <a:rPr lang="en-US" sz="4150" dirty="0">
-                <a:solidFill>
-                  <a:srgbClr val="161613"/>
-                </a:solidFill>
-                <a:latin typeface="DM Sans Medium" pitchFamily="34" charset="0"/>
-                <a:ea typeface="DM Sans Medium" pitchFamily="34" charset="-122"/>
-                <a:cs typeface="DM Sans Medium" pitchFamily="34" charset="-120"/>
-              </a:rPr>
-              <a:t>Arquitectura Técnica del Sistema</a:t>
-            </a:r>
-            <a:endParaRPr lang="en-US" sz="4150" dirty="0"/>
-          </a:p>
-        </p:txBody>
-      </p:sp>
-      <p:sp>
-        <p:nvSpPr>
-          <p:cNvPr id="4" name="Shape 1">
-            <a:extLst>
-              <a:ext uri="{FF2B5EF4-FFF2-40B4-BE49-F238E27FC236}">
-                <a16:creationId xmlns:a16="http://schemas.microsoft.com/office/drawing/2014/main" id="{24AEA073-4850-AC3A-7E46-36609EAB792A}"/>
-              </a:ext>
-            </a:extLst>
-          </p:cNvPr>
-          <p:cNvSpPr/>
-          <p:nvPr/>
-        </p:nvSpPr>
-        <p:spPr>
-          <a:xfrm>
-            <a:off x="6225302" y="2397204"/>
-            <a:ext cx="475059" cy="475059"/>
-          </a:xfrm>
-          <a:prstGeom prst="roundRect">
-            <a:avLst>
-              <a:gd name="adj" fmla="val 6667"/>
-            </a:avLst>
-          </a:prstGeom>
-          <a:solidFill>
-            <a:srgbClr val="EDEBE3"/>
-          </a:solidFill>
-          <a:ln/>
-        </p:spPr>
-        <p:txBody>
-          <a:bodyPr/>
-          <a:lstStyle/>
-          <a:p>
-            <a:endParaRPr lang="es-EC"/>
-          </a:p>
-        </p:txBody>
-      </p:sp>
-      <p:sp>
-        <p:nvSpPr>
-          <p:cNvPr id="5" name="Text 2">
-            <a:extLst>
-              <a:ext uri="{FF2B5EF4-FFF2-40B4-BE49-F238E27FC236}">
-                <a16:creationId xmlns:a16="http://schemas.microsoft.com/office/drawing/2014/main" id="{8A99989D-56F4-2393-AD5F-09F9D33BCF29}"/>
-              </a:ext>
-            </a:extLst>
-          </p:cNvPr>
-          <p:cNvSpPr/>
-          <p:nvPr/>
-        </p:nvSpPr>
-        <p:spPr>
-          <a:xfrm>
-            <a:off x="6304478" y="2436793"/>
-            <a:ext cx="316706" cy="395883"/>
-          </a:xfrm>
-          <a:prstGeom prst="rect">
-            <a:avLst/>
-          </a:prstGeom>
-          <a:noFill/>
-          <a:ln/>
-        </p:spPr>
-        <p:txBody>
-          <a:bodyPr wrap="none" lIns="0" tIns="0" rIns="0" bIns="0" rtlCol="0" anchor="t"/>
-          <a:lstStyle/>
-          <a:p>
-            <a:pPr marL="0" indent="0" algn="ctr">
-              <a:lnSpc>
-                <a:spcPts val="2450"/>
-              </a:lnSpc>
-              <a:buNone/>
-            </a:pPr>
-            <a:r>
-              <a:rPr lang="en-US" sz="2450" dirty="0">
-                <a:solidFill>
-                  <a:srgbClr val="161613"/>
-                </a:solidFill>
-                <a:latin typeface="DM Sans Medium" pitchFamily="34" charset="0"/>
-                <a:ea typeface="DM Sans Medium" pitchFamily="34" charset="-122"/>
-                <a:cs typeface="DM Sans Medium" pitchFamily="34" charset="-120"/>
-              </a:rPr>
-              <a:t>1</a:t>
-            </a:r>
-            <a:endParaRPr lang="en-US" sz="2450" dirty="0"/>
-          </a:p>
-        </p:txBody>
-      </p:sp>
-      <p:sp>
-        <p:nvSpPr>
-          <p:cNvPr id="6" name="Text 3">
-            <a:extLst>
-              <a:ext uri="{FF2B5EF4-FFF2-40B4-BE49-F238E27FC236}">
-                <a16:creationId xmlns:a16="http://schemas.microsoft.com/office/drawing/2014/main" id="{7FFFE5D3-FBF5-EBBB-6B03-87F058ECABCD}"/>
-              </a:ext>
-            </a:extLst>
-          </p:cNvPr>
-          <p:cNvSpPr/>
-          <p:nvPr/>
-        </p:nvSpPr>
-        <p:spPr>
-          <a:xfrm>
-            <a:off x="6911459" y="2469713"/>
-            <a:ext cx="2639258" cy="329922"/>
-          </a:xfrm>
-          <a:prstGeom prst="rect">
-            <a:avLst/>
-          </a:prstGeom>
-          <a:noFill/>
-          <a:ln/>
-        </p:spPr>
-        <p:txBody>
-          <a:bodyPr wrap="none" lIns="0" tIns="0" rIns="0" bIns="0" rtlCol="0" anchor="t"/>
-          <a:lstStyle/>
-          <a:p>
-            <a:pPr marL="0" indent="0" algn="l">
-              <a:lnSpc>
-                <a:spcPts val="2550"/>
-              </a:lnSpc>
-              <a:buNone/>
-            </a:pPr>
-            <a:r>
-              <a:rPr lang="en-US" sz="2050" dirty="0">
-                <a:solidFill>
-                  <a:srgbClr val="161613"/>
-                </a:solidFill>
-                <a:latin typeface="DM Sans Medium" pitchFamily="34" charset="0"/>
-                <a:ea typeface="DM Sans Medium" pitchFamily="34" charset="-122"/>
-                <a:cs typeface="DM Sans Medium" pitchFamily="34" charset="-120"/>
-              </a:rPr>
-              <a:t>Capa Presentación</a:t>
-            </a:r>
-            <a:endParaRPr lang="en-US" sz="2050" dirty="0"/>
-          </a:p>
-        </p:txBody>
-      </p:sp>
-      <p:sp>
-        <p:nvSpPr>
-          <p:cNvPr id="7" name="Text 4">
-            <a:extLst>
-              <a:ext uri="{FF2B5EF4-FFF2-40B4-BE49-F238E27FC236}">
-                <a16:creationId xmlns:a16="http://schemas.microsoft.com/office/drawing/2014/main" id="{4EFE3E98-5D77-B343-76D2-CB93529C95DE}"/>
-              </a:ext>
-            </a:extLst>
-          </p:cNvPr>
-          <p:cNvSpPr/>
-          <p:nvPr/>
-        </p:nvSpPr>
-        <p:spPr>
-          <a:xfrm>
-            <a:off x="6911459" y="2926318"/>
-            <a:ext cx="6980039" cy="337661"/>
-          </a:xfrm>
-          <a:prstGeom prst="rect">
-            <a:avLst/>
-          </a:prstGeom>
-          <a:noFill/>
-          <a:ln/>
-        </p:spPr>
-        <p:txBody>
-          <a:bodyPr wrap="none" lIns="0" tIns="0" rIns="0" bIns="0" rtlCol="0" anchor="t"/>
-          <a:lstStyle/>
-          <a:p>
-            <a:pPr marL="0" indent="0" algn="l">
-              <a:lnSpc>
-                <a:spcPts val="2650"/>
-              </a:lnSpc>
-              <a:buNone/>
-            </a:pPr>
-            <a:r>
-              <a:rPr lang="en-US" sz="1650" dirty="0">
-                <a:solidFill>
-                  <a:srgbClr val="161613"/>
-                </a:solidFill>
-                <a:latin typeface="Inter" pitchFamily="34" charset="0"/>
-                <a:ea typeface="Inter" pitchFamily="34" charset="-122"/>
-                <a:cs typeface="Inter" pitchFamily="34" charset="-120"/>
-              </a:rPr>
-              <a:t>Frontend con Next.js y React para una interfaz ágil y responsiva.</a:t>
-            </a:r>
-            <a:endParaRPr lang="en-US" sz="1650" dirty="0"/>
-          </a:p>
-        </p:txBody>
-      </p:sp>
-      <p:sp>
-        <p:nvSpPr>
-          <p:cNvPr id="8" name="Shape 5">
-            <a:extLst>
-              <a:ext uri="{FF2B5EF4-FFF2-40B4-BE49-F238E27FC236}">
-                <a16:creationId xmlns:a16="http://schemas.microsoft.com/office/drawing/2014/main" id="{3DAB01D7-D55F-1C9A-6374-03EC4DB97484}"/>
-              </a:ext>
-            </a:extLst>
-          </p:cNvPr>
-          <p:cNvSpPr/>
-          <p:nvPr/>
-        </p:nvSpPr>
-        <p:spPr>
-          <a:xfrm>
-            <a:off x="6225302" y="3686175"/>
-            <a:ext cx="475059" cy="475059"/>
-          </a:xfrm>
-          <a:prstGeom prst="roundRect">
-            <a:avLst>
-              <a:gd name="adj" fmla="val 6667"/>
-            </a:avLst>
-          </a:prstGeom>
-          <a:solidFill>
-            <a:srgbClr val="EDEBE3"/>
-          </a:solidFill>
-          <a:ln/>
-        </p:spPr>
-        <p:txBody>
-          <a:bodyPr/>
-          <a:lstStyle/>
-          <a:p>
-            <a:endParaRPr lang="es-EC"/>
-          </a:p>
-        </p:txBody>
-      </p:sp>
-      <p:sp>
-        <p:nvSpPr>
-          <p:cNvPr id="9" name="Text 6">
-            <a:extLst>
-              <a:ext uri="{FF2B5EF4-FFF2-40B4-BE49-F238E27FC236}">
-                <a16:creationId xmlns:a16="http://schemas.microsoft.com/office/drawing/2014/main" id="{A830C70A-6735-7E69-36EF-F2E1705515EC}"/>
-              </a:ext>
-            </a:extLst>
-          </p:cNvPr>
-          <p:cNvSpPr/>
-          <p:nvPr/>
-        </p:nvSpPr>
-        <p:spPr>
-          <a:xfrm>
-            <a:off x="6304478" y="3725763"/>
-            <a:ext cx="316706" cy="395883"/>
-          </a:xfrm>
-          <a:prstGeom prst="rect">
-            <a:avLst/>
-          </a:prstGeom>
-          <a:noFill/>
-          <a:ln/>
-        </p:spPr>
-        <p:txBody>
-          <a:bodyPr wrap="none" lIns="0" tIns="0" rIns="0" bIns="0" rtlCol="0" anchor="t"/>
-          <a:lstStyle/>
-          <a:p>
-            <a:pPr marL="0" indent="0" algn="ctr">
-              <a:lnSpc>
-                <a:spcPts val="2450"/>
-              </a:lnSpc>
-              <a:buNone/>
-            </a:pPr>
-            <a:r>
-              <a:rPr lang="en-US" sz="2450" dirty="0">
-                <a:solidFill>
-                  <a:srgbClr val="161613"/>
-                </a:solidFill>
-                <a:latin typeface="DM Sans Medium" pitchFamily="34" charset="0"/>
-                <a:ea typeface="DM Sans Medium" pitchFamily="34" charset="-122"/>
-                <a:cs typeface="DM Sans Medium" pitchFamily="34" charset="-120"/>
-              </a:rPr>
-              <a:t>2</a:t>
-            </a:r>
-            <a:endParaRPr lang="en-US" sz="2450" dirty="0"/>
-          </a:p>
-        </p:txBody>
-      </p:sp>
-      <p:sp>
-        <p:nvSpPr>
-          <p:cNvPr id="10" name="Text 7">
-            <a:extLst>
-              <a:ext uri="{FF2B5EF4-FFF2-40B4-BE49-F238E27FC236}">
-                <a16:creationId xmlns:a16="http://schemas.microsoft.com/office/drawing/2014/main" id="{D06A31D7-D37A-6A11-03B1-D021B141C916}"/>
-              </a:ext>
-            </a:extLst>
-          </p:cNvPr>
-          <p:cNvSpPr/>
-          <p:nvPr/>
-        </p:nvSpPr>
-        <p:spPr>
-          <a:xfrm>
-            <a:off x="6911459" y="3758684"/>
-            <a:ext cx="2639258" cy="329922"/>
-          </a:xfrm>
-          <a:prstGeom prst="rect">
-            <a:avLst/>
-          </a:prstGeom>
-          <a:noFill/>
-          <a:ln/>
-        </p:spPr>
-        <p:txBody>
-          <a:bodyPr wrap="none" lIns="0" tIns="0" rIns="0" bIns="0" rtlCol="0" anchor="t"/>
-          <a:lstStyle/>
-          <a:p>
-            <a:pPr marL="0" indent="0" algn="l">
-              <a:lnSpc>
-                <a:spcPts val="2550"/>
-              </a:lnSpc>
-              <a:buNone/>
-            </a:pPr>
-            <a:r>
-              <a:rPr lang="en-US" sz="2050" dirty="0">
-                <a:solidFill>
-                  <a:srgbClr val="161613"/>
-                </a:solidFill>
-                <a:latin typeface="DM Sans Medium" pitchFamily="34" charset="0"/>
-                <a:ea typeface="DM Sans Medium" pitchFamily="34" charset="-122"/>
-                <a:cs typeface="DM Sans Medium" pitchFamily="34" charset="-120"/>
-              </a:rPr>
-              <a:t>Capa Aplicación/API</a:t>
-            </a:r>
-            <a:endParaRPr lang="en-US" sz="2050" dirty="0"/>
-          </a:p>
-        </p:txBody>
-      </p:sp>
-      <p:sp>
-        <p:nvSpPr>
-          <p:cNvPr id="11" name="Text 8">
-            <a:extLst>
-              <a:ext uri="{FF2B5EF4-FFF2-40B4-BE49-F238E27FC236}">
-                <a16:creationId xmlns:a16="http://schemas.microsoft.com/office/drawing/2014/main" id="{2FE20889-8B99-7893-37A5-2FC6EA19A948}"/>
-              </a:ext>
-            </a:extLst>
-          </p:cNvPr>
-          <p:cNvSpPr/>
-          <p:nvPr/>
-        </p:nvSpPr>
-        <p:spPr>
-          <a:xfrm>
-            <a:off x="6911459" y="4215289"/>
-            <a:ext cx="6980039" cy="337661"/>
-          </a:xfrm>
-          <a:prstGeom prst="rect">
-            <a:avLst/>
-          </a:prstGeom>
-          <a:noFill/>
-          <a:ln/>
-        </p:spPr>
-        <p:txBody>
-          <a:bodyPr wrap="none" lIns="0" tIns="0" rIns="0" bIns="0" rtlCol="0" anchor="t"/>
-          <a:lstStyle/>
-          <a:p>
-            <a:pPr marL="0" indent="0" algn="l">
-              <a:lnSpc>
-                <a:spcPts val="2650"/>
-              </a:lnSpc>
-              <a:buNone/>
-            </a:pPr>
-            <a:r>
-              <a:rPr lang="en-US" sz="1650" dirty="0">
-                <a:solidFill>
-                  <a:srgbClr val="161613"/>
-                </a:solidFill>
-                <a:latin typeface="Inter" pitchFamily="34" charset="0"/>
-                <a:ea typeface="Inter" pitchFamily="34" charset="-122"/>
-                <a:cs typeface="Inter" pitchFamily="34" charset="-120"/>
-              </a:rPr>
-              <a:t>API REST en ASP.NET Core para manejo eficiente y seguro.</a:t>
-            </a:r>
-            <a:endParaRPr lang="en-US" sz="1650" dirty="0"/>
-          </a:p>
-        </p:txBody>
-      </p:sp>
-      <p:sp>
-        <p:nvSpPr>
-          <p:cNvPr id="12" name="Shape 9">
-            <a:extLst>
-              <a:ext uri="{FF2B5EF4-FFF2-40B4-BE49-F238E27FC236}">
-                <a16:creationId xmlns:a16="http://schemas.microsoft.com/office/drawing/2014/main" id="{6B3A2F47-6132-068F-1BD2-4EC558F58EFA}"/>
-              </a:ext>
-            </a:extLst>
-          </p:cNvPr>
-          <p:cNvSpPr/>
-          <p:nvPr/>
-        </p:nvSpPr>
-        <p:spPr>
-          <a:xfrm>
-            <a:off x="6225302" y="4975146"/>
-            <a:ext cx="475059" cy="475059"/>
-          </a:xfrm>
-          <a:prstGeom prst="roundRect">
-            <a:avLst>
-              <a:gd name="adj" fmla="val 6667"/>
-            </a:avLst>
-          </a:prstGeom>
-          <a:solidFill>
-            <a:srgbClr val="EDEBE3"/>
-          </a:solidFill>
-          <a:ln/>
-        </p:spPr>
-        <p:txBody>
-          <a:bodyPr/>
-          <a:lstStyle/>
-          <a:p>
-            <a:endParaRPr lang="es-EC"/>
-          </a:p>
-        </p:txBody>
-      </p:sp>
-      <p:sp>
-        <p:nvSpPr>
-          <p:cNvPr id="13" name="Text 10">
-            <a:extLst>
-              <a:ext uri="{FF2B5EF4-FFF2-40B4-BE49-F238E27FC236}">
-                <a16:creationId xmlns:a16="http://schemas.microsoft.com/office/drawing/2014/main" id="{14EBD927-53CA-07B1-0851-C242B8B1AFA4}"/>
-              </a:ext>
-            </a:extLst>
-          </p:cNvPr>
-          <p:cNvSpPr/>
-          <p:nvPr/>
-        </p:nvSpPr>
-        <p:spPr>
-          <a:xfrm>
-            <a:off x="6304478" y="5014734"/>
-            <a:ext cx="316706" cy="395883"/>
-          </a:xfrm>
-          <a:prstGeom prst="rect">
-            <a:avLst/>
-          </a:prstGeom>
-          <a:noFill/>
-          <a:ln/>
-        </p:spPr>
-        <p:txBody>
-          <a:bodyPr wrap="none" lIns="0" tIns="0" rIns="0" bIns="0" rtlCol="0" anchor="t"/>
-          <a:lstStyle/>
-          <a:p>
-            <a:pPr marL="0" indent="0" algn="ctr">
-              <a:lnSpc>
-                <a:spcPts val="2450"/>
-              </a:lnSpc>
-              <a:buNone/>
-            </a:pPr>
-            <a:r>
-              <a:rPr lang="en-US" sz="2450" dirty="0">
-                <a:solidFill>
-                  <a:srgbClr val="161613"/>
-                </a:solidFill>
-                <a:latin typeface="DM Sans Medium" pitchFamily="34" charset="0"/>
-                <a:ea typeface="DM Sans Medium" pitchFamily="34" charset="-122"/>
-                <a:cs typeface="DM Sans Medium" pitchFamily="34" charset="-120"/>
-              </a:rPr>
-              <a:t>3</a:t>
-            </a:r>
-            <a:endParaRPr lang="en-US" sz="2450" dirty="0"/>
-          </a:p>
-        </p:txBody>
-      </p:sp>
-      <p:sp>
-        <p:nvSpPr>
-          <p:cNvPr id="14" name="Text 11">
-            <a:extLst>
-              <a:ext uri="{FF2B5EF4-FFF2-40B4-BE49-F238E27FC236}">
-                <a16:creationId xmlns:a16="http://schemas.microsoft.com/office/drawing/2014/main" id="{78311FBE-133F-E531-C7CB-BF41A4097A82}"/>
-              </a:ext>
-            </a:extLst>
-          </p:cNvPr>
-          <p:cNvSpPr/>
-          <p:nvPr/>
-        </p:nvSpPr>
-        <p:spPr>
-          <a:xfrm>
-            <a:off x="6911459" y="5047655"/>
-            <a:ext cx="2639258" cy="329922"/>
-          </a:xfrm>
-          <a:prstGeom prst="rect">
-            <a:avLst/>
-          </a:prstGeom>
-          <a:noFill/>
-          <a:ln/>
-        </p:spPr>
-        <p:txBody>
-          <a:bodyPr wrap="none" lIns="0" tIns="0" rIns="0" bIns="0" rtlCol="0" anchor="t"/>
-          <a:lstStyle/>
-          <a:p>
-            <a:pPr marL="0" indent="0" algn="l">
-              <a:lnSpc>
-                <a:spcPts val="2550"/>
-              </a:lnSpc>
-              <a:buNone/>
-            </a:pPr>
-            <a:r>
-              <a:rPr lang="en-US" sz="2050" dirty="0">
-                <a:solidFill>
-                  <a:srgbClr val="161613"/>
-                </a:solidFill>
-                <a:latin typeface="DM Sans Medium" pitchFamily="34" charset="0"/>
-                <a:ea typeface="DM Sans Medium" pitchFamily="34" charset="-122"/>
-                <a:cs typeface="DM Sans Medium" pitchFamily="34" charset="-120"/>
-              </a:rPr>
-              <a:t>Lógica de Negocio</a:t>
-            </a:r>
-            <a:endParaRPr lang="en-US" sz="2050" dirty="0"/>
-          </a:p>
-        </p:txBody>
-      </p:sp>
-      <p:sp>
-        <p:nvSpPr>
-          <p:cNvPr id="15" name="Text 12">
-            <a:extLst>
-              <a:ext uri="{FF2B5EF4-FFF2-40B4-BE49-F238E27FC236}">
-                <a16:creationId xmlns:a16="http://schemas.microsoft.com/office/drawing/2014/main" id="{46AB5E09-9613-9C5A-573C-E736E627D83C}"/>
-              </a:ext>
-            </a:extLst>
-          </p:cNvPr>
-          <p:cNvSpPr/>
-          <p:nvPr/>
-        </p:nvSpPr>
-        <p:spPr>
-          <a:xfrm>
-            <a:off x="6911459" y="5504259"/>
-            <a:ext cx="6980039" cy="337661"/>
-          </a:xfrm>
-          <a:prstGeom prst="rect">
-            <a:avLst/>
-          </a:prstGeom>
-          <a:noFill/>
-          <a:ln/>
-        </p:spPr>
-        <p:txBody>
-          <a:bodyPr wrap="none" lIns="0" tIns="0" rIns="0" bIns="0" rtlCol="0" anchor="t"/>
-          <a:lstStyle/>
-          <a:p>
-            <a:pPr marL="0" indent="0" algn="l">
-              <a:lnSpc>
-                <a:spcPts val="2650"/>
-              </a:lnSpc>
-              <a:buNone/>
-            </a:pPr>
-            <a:r>
-              <a:rPr lang="en-US" sz="1650" dirty="0">
-                <a:solidFill>
-                  <a:srgbClr val="161613"/>
-                </a:solidFill>
-                <a:latin typeface="Inter" pitchFamily="34" charset="0"/>
-                <a:ea typeface="Inter" pitchFamily="34" charset="-122"/>
-                <a:cs typeface="Inter" pitchFamily="34" charset="-120"/>
-              </a:rPr>
-              <a:t>Servicios en C# que implementan reglas y procesos esenciales.</a:t>
-            </a:r>
-            <a:endParaRPr lang="en-US" sz="1650" dirty="0"/>
-          </a:p>
-        </p:txBody>
-      </p:sp>
-      <p:sp>
-        <p:nvSpPr>
-          <p:cNvPr id="16" name="Shape 13">
-            <a:extLst>
-              <a:ext uri="{FF2B5EF4-FFF2-40B4-BE49-F238E27FC236}">
-                <a16:creationId xmlns:a16="http://schemas.microsoft.com/office/drawing/2014/main" id="{F83357C1-1BC4-ED59-AE38-72D6BEE69DE4}"/>
-              </a:ext>
-            </a:extLst>
-          </p:cNvPr>
-          <p:cNvSpPr/>
-          <p:nvPr/>
-        </p:nvSpPr>
-        <p:spPr>
-          <a:xfrm>
-            <a:off x="6225302" y="6264116"/>
-            <a:ext cx="475059" cy="475059"/>
-          </a:xfrm>
-          <a:prstGeom prst="roundRect">
-            <a:avLst>
-              <a:gd name="adj" fmla="val 6667"/>
-            </a:avLst>
-          </a:prstGeom>
-          <a:solidFill>
-            <a:srgbClr val="EDEBE3"/>
-          </a:solidFill>
-          <a:ln/>
-        </p:spPr>
-        <p:txBody>
-          <a:bodyPr/>
-          <a:lstStyle/>
-          <a:p>
-            <a:endParaRPr lang="es-EC"/>
-          </a:p>
-        </p:txBody>
-      </p:sp>
-      <p:sp>
-        <p:nvSpPr>
-          <p:cNvPr id="17" name="Text 14">
-            <a:extLst>
-              <a:ext uri="{FF2B5EF4-FFF2-40B4-BE49-F238E27FC236}">
-                <a16:creationId xmlns:a16="http://schemas.microsoft.com/office/drawing/2014/main" id="{D134AFBA-1086-1C7D-D1FD-5F7CC97A99D1}"/>
-              </a:ext>
-            </a:extLst>
-          </p:cNvPr>
-          <p:cNvSpPr/>
-          <p:nvPr/>
-        </p:nvSpPr>
-        <p:spPr>
-          <a:xfrm>
-            <a:off x="6304478" y="6303705"/>
-            <a:ext cx="316706" cy="395883"/>
-          </a:xfrm>
-          <a:prstGeom prst="rect">
-            <a:avLst/>
-          </a:prstGeom>
-          <a:noFill/>
-          <a:ln/>
-        </p:spPr>
-        <p:txBody>
-          <a:bodyPr wrap="none" lIns="0" tIns="0" rIns="0" bIns="0" rtlCol="0" anchor="t"/>
-          <a:lstStyle/>
-          <a:p>
-            <a:pPr marL="0" indent="0" algn="ctr">
-              <a:lnSpc>
-                <a:spcPts val="2450"/>
-              </a:lnSpc>
-              <a:buNone/>
-            </a:pPr>
-            <a:r>
-              <a:rPr lang="en-US" sz="2450" dirty="0">
-                <a:solidFill>
-                  <a:srgbClr val="161613"/>
-                </a:solidFill>
-                <a:latin typeface="DM Sans Medium" pitchFamily="34" charset="0"/>
-                <a:ea typeface="DM Sans Medium" pitchFamily="34" charset="-122"/>
-                <a:cs typeface="DM Sans Medium" pitchFamily="34" charset="-120"/>
-              </a:rPr>
-              <a:t>4</a:t>
-            </a:r>
-            <a:endParaRPr lang="en-US" sz="2450" dirty="0"/>
-          </a:p>
-        </p:txBody>
-      </p:sp>
-      <p:sp>
-        <p:nvSpPr>
-          <p:cNvPr id="18" name="Text 15">
-            <a:extLst>
-              <a:ext uri="{FF2B5EF4-FFF2-40B4-BE49-F238E27FC236}">
-                <a16:creationId xmlns:a16="http://schemas.microsoft.com/office/drawing/2014/main" id="{6AA13C89-ED34-1AD4-EA29-263C082B70EF}"/>
-              </a:ext>
-            </a:extLst>
-          </p:cNvPr>
-          <p:cNvSpPr/>
-          <p:nvPr/>
-        </p:nvSpPr>
-        <p:spPr>
-          <a:xfrm>
-            <a:off x="6911459" y="6336625"/>
-            <a:ext cx="2639258" cy="329922"/>
-          </a:xfrm>
-          <a:prstGeom prst="rect">
-            <a:avLst/>
-          </a:prstGeom>
-          <a:noFill/>
-          <a:ln/>
-        </p:spPr>
-        <p:txBody>
-          <a:bodyPr wrap="none" lIns="0" tIns="0" rIns="0" bIns="0" rtlCol="0" anchor="t"/>
-          <a:lstStyle/>
-          <a:p>
-            <a:pPr marL="0" indent="0" algn="l">
-              <a:lnSpc>
-                <a:spcPts val="2550"/>
-              </a:lnSpc>
-              <a:buNone/>
-            </a:pPr>
-            <a:r>
-              <a:rPr lang="en-US" sz="2050" dirty="0">
-                <a:solidFill>
-                  <a:srgbClr val="161613"/>
-                </a:solidFill>
-                <a:latin typeface="DM Sans Medium" pitchFamily="34" charset="0"/>
-                <a:ea typeface="DM Sans Medium" pitchFamily="34" charset="-122"/>
-                <a:cs typeface="DM Sans Medium" pitchFamily="34" charset="-120"/>
-              </a:rPr>
-              <a:t>Persistencia</a:t>
-            </a:r>
-            <a:endParaRPr lang="en-US" sz="2050" dirty="0"/>
-          </a:p>
-        </p:txBody>
-      </p:sp>
-      <p:sp>
-        <p:nvSpPr>
-          <p:cNvPr id="19" name="Text 16">
-            <a:extLst>
-              <a:ext uri="{FF2B5EF4-FFF2-40B4-BE49-F238E27FC236}">
-                <a16:creationId xmlns:a16="http://schemas.microsoft.com/office/drawing/2014/main" id="{59336904-712F-4CE2-7111-43100B416F6C}"/>
-              </a:ext>
-            </a:extLst>
-          </p:cNvPr>
-          <p:cNvSpPr/>
-          <p:nvPr/>
-        </p:nvSpPr>
-        <p:spPr>
-          <a:xfrm>
-            <a:off x="6911459" y="6793230"/>
-            <a:ext cx="6980039" cy="675323"/>
-          </a:xfrm>
-          <a:prstGeom prst="rect">
-            <a:avLst/>
-          </a:prstGeom>
-          <a:noFill/>
-          <a:ln/>
-        </p:spPr>
-        <p:txBody>
-          <a:bodyPr wrap="square" lIns="0" tIns="0" rIns="0" bIns="0" rtlCol="0" anchor="t"/>
-          <a:lstStyle/>
-          <a:p>
-            <a:pPr marL="0" indent="0" algn="l">
-              <a:lnSpc>
-                <a:spcPts val="2650"/>
-              </a:lnSpc>
-              <a:buNone/>
-            </a:pPr>
-            <a:r>
-              <a:rPr lang="en-US" sz="1650" dirty="0">
-                <a:solidFill>
-                  <a:srgbClr val="161613"/>
-                </a:solidFill>
-                <a:latin typeface="Inter" pitchFamily="34" charset="0"/>
-                <a:ea typeface="Inter" pitchFamily="34" charset="-122"/>
-                <a:cs typeface="Inter" pitchFamily="34" charset="-120"/>
-              </a:rPr>
-              <a:t>Base de datos PostgreSQL mediante Entity Framework Core para integridad y rendimiento.</a:t>
-            </a:r>
-            <a:endParaRPr lang="en-US" sz="1650" dirty="0"/>
-          </a:p>
-        </p:txBody>
-      </p:sp>
-    </p:spTree>
-    <p:extLst>
-      <p:ext uri="{BB962C8B-B14F-4D97-AF65-F5344CB8AC3E}">
-        <p14:creationId xmlns:p14="http://schemas.microsoft.com/office/powerpoint/2010/main" val="971730288"/>
-      </p:ext>
-    </p:extLst>
-  </p:cSld>
-  <p:clrMapOvr>
-    <a:masterClrMapping/>
-  </p:clrMapOvr>
-</p:sld>
-</file>
-
-<file path=ppt/slides/slide5.xml><?xml version="1.0" encoding="utf-8"?>
-<p:sld xmlns:a="http://schemas.openxmlformats.org/drawingml/2006/main" xmlns:r="http://schemas.openxmlformats.org/officeDocument/2006/relationships" xmlns:p="http://schemas.openxmlformats.org/presentationml/2006/main">
   <p:cSld name="Slide 4">
     <p:spTree>
       <p:nvGrpSpPr>
@@ -3828,10 +2998,10 @@
       </p:sp>
       <p:pic>
         <p:nvPicPr>
-          <p:cNvPr id="23" name="Imagen 22">
+          <p:cNvPr id="25" name="Imagen 24">
             <a:extLst>
               <a:ext uri="{FF2B5EF4-FFF2-40B4-BE49-F238E27FC236}">
-                <a16:creationId xmlns:a16="http://schemas.microsoft.com/office/drawing/2014/main" id="{97F22261-CF61-B94A-0F6E-BE8C01109E35}"/>
+                <a16:creationId xmlns:a16="http://schemas.microsoft.com/office/drawing/2014/main" id="{5E7F24E5-6F28-4D57-5878-DD253F61BCDC}"/>
               </a:ext>
             </a:extLst>
           </p:cNvPr>
@@ -3848,8 +3018,8 @@
         </p:blipFill>
         <p:spPr>
           <a:xfrm>
-            <a:off x="1051135" y="1108539"/>
-            <a:ext cx="13055157" cy="6933739"/>
+            <a:off x="1336884" y="1157287"/>
+            <a:ext cx="12360065" cy="6550834"/>
           </a:xfrm>
           <a:prstGeom prst="rect">
             <a:avLst/>
@@ -3857,6 +3027,836 @@
         </p:spPr>
       </p:pic>
     </p:spTree>
+  </p:cSld>
+  <p:clrMapOvr>
+    <a:masterClrMapping/>
+  </p:clrMapOvr>
+</p:sld>
+</file>
+
+<file path=ppt/slides/slide5.xml><?xml version="1.0" encoding="utf-8"?>
+<p:sld xmlns:a="http://schemas.openxmlformats.org/drawingml/2006/main" xmlns:r="http://schemas.openxmlformats.org/officeDocument/2006/relationships" xmlns:p="http://schemas.openxmlformats.org/presentationml/2006/main">
+  <p:cSld>
+    <p:spTree>
+      <p:nvGrpSpPr>
+        <p:cNvPr id="1" name="">
+          <a:extLst>
+            <a:ext uri="{FF2B5EF4-FFF2-40B4-BE49-F238E27FC236}">
+              <a16:creationId xmlns:a16="http://schemas.microsoft.com/office/drawing/2014/main" id="{61FE0A2F-151D-817F-4591-8F02E7D684A5}"/>
+            </a:ext>
+          </a:extLst>
+        </p:cNvPr>
+        <p:cNvGrpSpPr/>
+        <p:nvPr/>
+      </p:nvGrpSpPr>
+      <p:grpSpPr>
+        <a:xfrm>
+          <a:off x="0" y="0"/>
+          <a:ext cx="0" cy="0"/>
+          <a:chOff x="0" y="0"/>
+          <a:chExt cx="0" cy="0"/>
+        </a:xfrm>
+      </p:grpSpPr>
+      <p:pic>
+        <p:nvPicPr>
+          <p:cNvPr id="2" name="Image 0" descr="preencoded.png">
+            <a:extLst>
+              <a:ext uri="{FF2B5EF4-FFF2-40B4-BE49-F238E27FC236}">
+                <a16:creationId xmlns:a16="http://schemas.microsoft.com/office/drawing/2014/main" id="{06DFD035-277C-D83B-0DEF-66FF109467E4}"/>
+              </a:ext>
+            </a:extLst>
+          </p:cNvPr>
+          <p:cNvPicPr>
+            <a:picLocks noChangeAspect="1"/>
+          </p:cNvPicPr>
+          <p:nvPr/>
+        </p:nvPicPr>
+        <p:blipFill>
+          <a:blip r:embed="rId3"/>
+          <a:stretch>
+            <a:fillRect/>
+          </a:stretch>
+        </p:blipFill>
+        <p:spPr>
+          <a:xfrm>
+            <a:off x="0" y="0"/>
+            <a:ext cx="5486400" cy="8229600"/>
+          </a:xfrm>
+          <a:prstGeom prst="rect">
+            <a:avLst/>
+          </a:prstGeom>
+        </p:spPr>
+      </p:pic>
+      <p:sp>
+        <p:nvSpPr>
+          <p:cNvPr id="3" name="Text 0">
+            <a:extLst>
+              <a:ext uri="{FF2B5EF4-FFF2-40B4-BE49-F238E27FC236}">
+                <a16:creationId xmlns:a16="http://schemas.microsoft.com/office/drawing/2014/main" id="{CAA18F81-3C0C-A8ED-19C5-B9A27945D63E}"/>
+              </a:ext>
+            </a:extLst>
+          </p:cNvPr>
+          <p:cNvSpPr/>
+          <p:nvPr/>
+        </p:nvSpPr>
+        <p:spPr>
+          <a:xfrm>
+            <a:off x="6225302" y="761048"/>
+            <a:ext cx="7666196" cy="1319451"/>
+          </a:xfrm>
+          <a:prstGeom prst="rect">
+            <a:avLst/>
+          </a:prstGeom>
+          <a:noFill/>
+          <a:ln/>
+        </p:spPr>
+        <p:txBody>
+          <a:bodyPr wrap="square" lIns="0" tIns="0" rIns="0" bIns="0" rtlCol="0" anchor="t"/>
+          <a:lstStyle/>
+          <a:p>
+            <a:pPr marL="0" indent="0" algn="l">
+              <a:lnSpc>
+                <a:spcPts val="5150"/>
+              </a:lnSpc>
+              <a:buNone/>
+            </a:pPr>
+            <a:r>
+              <a:rPr lang="en-US" sz="4150" dirty="0">
+                <a:solidFill>
+                  <a:srgbClr val="161613"/>
+                </a:solidFill>
+                <a:latin typeface="DM Sans Medium" pitchFamily="34" charset="0"/>
+                <a:ea typeface="DM Sans Medium" pitchFamily="34" charset="-122"/>
+                <a:cs typeface="DM Sans Medium" pitchFamily="34" charset="-120"/>
+              </a:rPr>
+              <a:t>Arquitectura Técnica del Sistema</a:t>
+            </a:r>
+            <a:endParaRPr lang="en-US" sz="4150" dirty="0"/>
+          </a:p>
+        </p:txBody>
+      </p:sp>
+      <p:sp>
+        <p:nvSpPr>
+          <p:cNvPr id="4" name="Shape 1">
+            <a:extLst>
+              <a:ext uri="{FF2B5EF4-FFF2-40B4-BE49-F238E27FC236}">
+                <a16:creationId xmlns:a16="http://schemas.microsoft.com/office/drawing/2014/main" id="{24AEA073-4850-AC3A-7E46-36609EAB792A}"/>
+              </a:ext>
+            </a:extLst>
+          </p:cNvPr>
+          <p:cNvSpPr/>
+          <p:nvPr/>
+        </p:nvSpPr>
+        <p:spPr>
+          <a:xfrm>
+            <a:off x="6225302" y="2397204"/>
+            <a:ext cx="475059" cy="475059"/>
+          </a:xfrm>
+          <a:prstGeom prst="roundRect">
+            <a:avLst>
+              <a:gd name="adj" fmla="val 6667"/>
+            </a:avLst>
+          </a:prstGeom>
+          <a:solidFill>
+            <a:srgbClr val="EDEBE3"/>
+          </a:solidFill>
+          <a:ln/>
+        </p:spPr>
+        <p:txBody>
+          <a:bodyPr/>
+          <a:lstStyle/>
+          <a:p>
+            <a:endParaRPr lang="es-EC"/>
+          </a:p>
+        </p:txBody>
+      </p:sp>
+      <p:sp>
+        <p:nvSpPr>
+          <p:cNvPr id="5" name="Text 2">
+            <a:extLst>
+              <a:ext uri="{FF2B5EF4-FFF2-40B4-BE49-F238E27FC236}">
+                <a16:creationId xmlns:a16="http://schemas.microsoft.com/office/drawing/2014/main" id="{8A99989D-56F4-2393-AD5F-09F9D33BCF29}"/>
+              </a:ext>
+            </a:extLst>
+          </p:cNvPr>
+          <p:cNvSpPr/>
+          <p:nvPr/>
+        </p:nvSpPr>
+        <p:spPr>
+          <a:xfrm>
+            <a:off x="6304478" y="2436793"/>
+            <a:ext cx="316706" cy="395883"/>
+          </a:xfrm>
+          <a:prstGeom prst="rect">
+            <a:avLst/>
+          </a:prstGeom>
+          <a:noFill/>
+          <a:ln/>
+        </p:spPr>
+        <p:txBody>
+          <a:bodyPr wrap="none" lIns="0" tIns="0" rIns="0" bIns="0" rtlCol="0" anchor="t"/>
+          <a:lstStyle/>
+          <a:p>
+            <a:pPr marL="0" indent="0" algn="ctr">
+              <a:lnSpc>
+                <a:spcPts val="2450"/>
+              </a:lnSpc>
+              <a:buNone/>
+            </a:pPr>
+            <a:r>
+              <a:rPr lang="en-US" sz="2450" dirty="0">
+                <a:solidFill>
+                  <a:srgbClr val="161613"/>
+                </a:solidFill>
+                <a:latin typeface="DM Sans Medium" pitchFamily="34" charset="0"/>
+                <a:ea typeface="DM Sans Medium" pitchFamily="34" charset="-122"/>
+                <a:cs typeface="DM Sans Medium" pitchFamily="34" charset="-120"/>
+              </a:rPr>
+              <a:t>1</a:t>
+            </a:r>
+            <a:endParaRPr lang="en-US" sz="2450" dirty="0"/>
+          </a:p>
+        </p:txBody>
+      </p:sp>
+      <p:sp>
+        <p:nvSpPr>
+          <p:cNvPr id="6" name="Text 3">
+            <a:extLst>
+              <a:ext uri="{FF2B5EF4-FFF2-40B4-BE49-F238E27FC236}">
+                <a16:creationId xmlns:a16="http://schemas.microsoft.com/office/drawing/2014/main" id="{7FFFE5D3-FBF5-EBBB-6B03-87F058ECABCD}"/>
+              </a:ext>
+            </a:extLst>
+          </p:cNvPr>
+          <p:cNvSpPr/>
+          <p:nvPr/>
+        </p:nvSpPr>
+        <p:spPr>
+          <a:xfrm>
+            <a:off x="6911459" y="2469713"/>
+            <a:ext cx="2639258" cy="329922"/>
+          </a:xfrm>
+          <a:prstGeom prst="rect">
+            <a:avLst/>
+          </a:prstGeom>
+          <a:noFill/>
+          <a:ln/>
+        </p:spPr>
+        <p:txBody>
+          <a:bodyPr wrap="none" lIns="0" tIns="0" rIns="0" bIns="0" rtlCol="0" anchor="t"/>
+          <a:lstStyle/>
+          <a:p>
+            <a:pPr marL="0" indent="0" algn="l">
+              <a:lnSpc>
+                <a:spcPts val="2550"/>
+              </a:lnSpc>
+              <a:buNone/>
+            </a:pPr>
+            <a:r>
+              <a:rPr lang="en-US" sz="2050" dirty="0">
+                <a:solidFill>
+                  <a:srgbClr val="161613"/>
+                </a:solidFill>
+                <a:latin typeface="DM Sans Medium" pitchFamily="34" charset="0"/>
+                <a:ea typeface="DM Sans Medium" pitchFamily="34" charset="-122"/>
+                <a:cs typeface="DM Sans Medium" pitchFamily="34" charset="-120"/>
+              </a:rPr>
+              <a:t>Capa Presentación</a:t>
+            </a:r>
+            <a:endParaRPr lang="en-US" sz="2050" dirty="0"/>
+          </a:p>
+        </p:txBody>
+      </p:sp>
+      <p:sp>
+        <p:nvSpPr>
+          <p:cNvPr id="7" name="Text 4">
+            <a:extLst>
+              <a:ext uri="{FF2B5EF4-FFF2-40B4-BE49-F238E27FC236}">
+                <a16:creationId xmlns:a16="http://schemas.microsoft.com/office/drawing/2014/main" id="{4EFE3E98-5D77-B343-76D2-CB93529C95DE}"/>
+              </a:ext>
+            </a:extLst>
+          </p:cNvPr>
+          <p:cNvSpPr/>
+          <p:nvPr/>
+        </p:nvSpPr>
+        <p:spPr>
+          <a:xfrm>
+            <a:off x="6911459" y="2926318"/>
+            <a:ext cx="6980039" cy="337661"/>
+          </a:xfrm>
+          <a:prstGeom prst="rect">
+            <a:avLst/>
+          </a:prstGeom>
+          <a:noFill/>
+          <a:ln/>
+        </p:spPr>
+        <p:txBody>
+          <a:bodyPr wrap="none" lIns="0" tIns="0" rIns="0" bIns="0" rtlCol="0" anchor="t"/>
+          <a:lstStyle/>
+          <a:p>
+            <a:pPr marL="0" indent="0" algn="l">
+              <a:lnSpc>
+                <a:spcPts val="2650"/>
+              </a:lnSpc>
+              <a:buNone/>
+            </a:pPr>
+            <a:r>
+              <a:rPr lang="en-US" sz="1650" dirty="0">
+                <a:solidFill>
+                  <a:srgbClr val="161613"/>
+                </a:solidFill>
+                <a:latin typeface="Inter" pitchFamily="34" charset="0"/>
+                <a:ea typeface="Inter" pitchFamily="34" charset="-122"/>
+                <a:cs typeface="Inter" pitchFamily="34" charset="-120"/>
+              </a:rPr>
+              <a:t>Frontend con Next.js y React para una interfaz ágil y responsiva.</a:t>
+            </a:r>
+            <a:endParaRPr lang="en-US" sz="1650" dirty="0"/>
+          </a:p>
+        </p:txBody>
+      </p:sp>
+      <p:sp>
+        <p:nvSpPr>
+          <p:cNvPr id="8" name="Shape 5">
+            <a:extLst>
+              <a:ext uri="{FF2B5EF4-FFF2-40B4-BE49-F238E27FC236}">
+                <a16:creationId xmlns:a16="http://schemas.microsoft.com/office/drawing/2014/main" id="{3DAB01D7-D55F-1C9A-6374-03EC4DB97484}"/>
+              </a:ext>
+            </a:extLst>
+          </p:cNvPr>
+          <p:cNvSpPr/>
+          <p:nvPr/>
+        </p:nvSpPr>
+        <p:spPr>
+          <a:xfrm>
+            <a:off x="6225302" y="3686175"/>
+            <a:ext cx="475059" cy="475059"/>
+          </a:xfrm>
+          <a:prstGeom prst="roundRect">
+            <a:avLst>
+              <a:gd name="adj" fmla="val 6667"/>
+            </a:avLst>
+          </a:prstGeom>
+          <a:solidFill>
+            <a:srgbClr val="EDEBE3"/>
+          </a:solidFill>
+          <a:ln/>
+        </p:spPr>
+        <p:txBody>
+          <a:bodyPr/>
+          <a:lstStyle/>
+          <a:p>
+            <a:endParaRPr lang="es-EC"/>
+          </a:p>
+        </p:txBody>
+      </p:sp>
+      <p:sp>
+        <p:nvSpPr>
+          <p:cNvPr id="9" name="Text 6">
+            <a:extLst>
+              <a:ext uri="{FF2B5EF4-FFF2-40B4-BE49-F238E27FC236}">
+                <a16:creationId xmlns:a16="http://schemas.microsoft.com/office/drawing/2014/main" id="{A830C70A-6735-7E69-36EF-F2E1705515EC}"/>
+              </a:ext>
+            </a:extLst>
+          </p:cNvPr>
+          <p:cNvSpPr/>
+          <p:nvPr/>
+        </p:nvSpPr>
+        <p:spPr>
+          <a:xfrm>
+            <a:off x="6304478" y="3725763"/>
+            <a:ext cx="316706" cy="395883"/>
+          </a:xfrm>
+          <a:prstGeom prst="rect">
+            <a:avLst/>
+          </a:prstGeom>
+          <a:noFill/>
+          <a:ln/>
+        </p:spPr>
+        <p:txBody>
+          <a:bodyPr wrap="none" lIns="0" tIns="0" rIns="0" bIns="0" rtlCol="0" anchor="t"/>
+          <a:lstStyle/>
+          <a:p>
+            <a:pPr marL="0" indent="0" algn="ctr">
+              <a:lnSpc>
+                <a:spcPts val="2450"/>
+              </a:lnSpc>
+              <a:buNone/>
+            </a:pPr>
+            <a:r>
+              <a:rPr lang="en-US" sz="2450" dirty="0">
+                <a:solidFill>
+                  <a:srgbClr val="161613"/>
+                </a:solidFill>
+                <a:latin typeface="DM Sans Medium" pitchFamily="34" charset="0"/>
+                <a:ea typeface="DM Sans Medium" pitchFamily="34" charset="-122"/>
+                <a:cs typeface="DM Sans Medium" pitchFamily="34" charset="-120"/>
+              </a:rPr>
+              <a:t>2</a:t>
+            </a:r>
+            <a:endParaRPr lang="en-US" sz="2450" dirty="0"/>
+          </a:p>
+        </p:txBody>
+      </p:sp>
+      <p:sp>
+        <p:nvSpPr>
+          <p:cNvPr id="10" name="Text 7">
+            <a:extLst>
+              <a:ext uri="{FF2B5EF4-FFF2-40B4-BE49-F238E27FC236}">
+                <a16:creationId xmlns:a16="http://schemas.microsoft.com/office/drawing/2014/main" id="{D06A31D7-D37A-6A11-03B1-D021B141C916}"/>
+              </a:ext>
+            </a:extLst>
+          </p:cNvPr>
+          <p:cNvSpPr/>
+          <p:nvPr/>
+        </p:nvSpPr>
+        <p:spPr>
+          <a:xfrm>
+            <a:off x="6911459" y="3758684"/>
+            <a:ext cx="2639258" cy="329922"/>
+          </a:xfrm>
+          <a:prstGeom prst="rect">
+            <a:avLst/>
+          </a:prstGeom>
+          <a:noFill/>
+          <a:ln/>
+        </p:spPr>
+        <p:txBody>
+          <a:bodyPr wrap="none" lIns="0" tIns="0" rIns="0" bIns="0" rtlCol="0" anchor="t"/>
+          <a:lstStyle/>
+          <a:p>
+            <a:pPr marL="0" indent="0" algn="l">
+              <a:lnSpc>
+                <a:spcPts val="2550"/>
+              </a:lnSpc>
+              <a:buNone/>
+            </a:pPr>
+            <a:r>
+              <a:rPr lang="en-US" sz="2050" dirty="0">
+                <a:solidFill>
+                  <a:srgbClr val="161613"/>
+                </a:solidFill>
+                <a:latin typeface="DM Sans Medium" pitchFamily="34" charset="0"/>
+                <a:ea typeface="DM Sans Medium" pitchFamily="34" charset="-122"/>
+                <a:cs typeface="DM Sans Medium" pitchFamily="34" charset="-120"/>
+              </a:rPr>
+              <a:t>Capa Aplicación/API</a:t>
+            </a:r>
+            <a:endParaRPr lang="en-US" sz="2050" dirty="0"/>
+          </a:p>
+        </p:txBody>
+      </p:sp>
+      <p:sp>
+        <p:nvSpPr>
+          <p:cNvPr id="11" name="Text 8">
+            <a:extLst>
+              <a:ext uri="{FF2B5EF4-FFF2-40B4-BE49-F238E27FC236}">
+                <a16:creationId xmlns:a16="http://schemas.microsoft.com/office/drawing/2014/main" id="{2FE20889-8B99-7893-37A5-2FC6EA19A948}"/>
+              </a:ext>
+            </a:extLst>
+          </p:cNvPr>
+          <p:cNvSpPr/>
+          <p:nvPr/>
+        </p:nvSpPr>
+        <p:spPr>
+          <a:xfrm>
+            <a:off x="6911459" y="4215289"/>
+            <a:ext cx="6980039" cy="337661"/>
+          </a:xfrm>
+          <a:prstGeom prst="rect">
+            <a:avLst/>
+          </a:prstGeom>
+          <a:noFill/>
+          <a:ln/>
+        </p:spPr>
+        <p:txBody>
+          <a:bodyPr wrap="none" lIns="0" tIns="0" rIns="0" bIns="0" rtlCol="0" anchor="t"/>
+          <a:lstStyle/>
+          <a:p>
+            <a:pPr marL="0" indent="0" algn="l">
+              <a:lnSpc>
+                <a:spcPts val="2650"/>
+              </a:lnSpc>
+              <a:buNone/>
+            </a:pPr>
+            <a:r>
+              <a:rPr lang="en-US" sz="1650" dirty="0">
+                <a:solidFill>
+                  <a:srgbClr val="161613"/>
+                </a:solidFill>
+                <a:latin typeface="Inter" pitchFamily="34" charset="0"/>
+                <a:ea typeface="Inter" pitchFamily="34" charset="-122"/>
+                <a:cs typeface="Inter" pitchFamily="34" charset="-120"/>
+              </a:rPr>
+              <a:t>API REST en ASP.NET Core para manejo eficiente y seguro.</a:t>
+            </a:r>
+            <a:endParaRPr lang="en-US" sz="1650" dirty="0"/>
+          </a:p>
+        </p:txBody>
+      </p:sp>
+      <p:sp>
+        <p:nvSpPr>
+          <p:cNvPr id="12" name="Shape 9">
+            <a:extLst>
+              <a:ext uri="{FF2B5EF4-FFF2-40B4-BE49-F238E27FC236}">
+                <a16:creationId xmlns:a16="http://schemas.microsoft.com/office/drawing/2014/main" id="{6B3A2F47-6132-068F-1BD2-4EC558F58EFA}"/>
+              </a:ext>
+            </a:extLst>
+          </p:cNvPr>
+          <p:cNvSpPr/>
+          <p:nvPr/>
+        </p:nvSpPr>
+        <p:spPr>
+          <a:xfrm>
+            <a:off x="6225302" y="4975146"/>
+            <a:ext cx="475059" cy="475059"/>
+          </a:xfrm>
+          <a:prstGeom prst="roundRect">
+            <a:avLst>
+              <a:gd name="adj" fmla="val 6667"/>
+            </a:avLst>
+          </a:prstGeom>
+          <a:solidFill>
+            <a:srgbClr val="EDEBE3"/>
+          </a:solidFill>
+          <a:ln/>
+        </p:spPr>
+        <p:txBody>
+          <a:bodyPr/>
+          <a:lstStyle/>
+          <a:p>
+            <a:endParaRPr lang="es-EC"/>
+          </a:p>
+        </p:txBody>
+      </p:sp>
+      <p:sp>
+        <p:nvSpPr>
+          <p:cNvPr id="13" name="Text 10">
+            <a:extLst>
+              <a:ext uri="{FF2B5EF4-FFF2-40B4-BE49-F238E27FC236}">
+                <a16:creationId xmlns:a16="http://schemas.microsoft.com/office/drawing/2014/main" id="{14EBD927-53CA-07B1-0851-C242B8B1AFA4}"/>
+              </a:ext>
+            </a:extLst>
+          </p:cNvPr>
+          <p:cNvSpPr/>
+          <p:nvPr/>
+        </p:nvSpPr>
+        <p:spPr>
+          <a:xfrm>
+            <a:off x="6304478" y="5014734"/>
+            <a:ext cx="316706" cy="395883"/>
+          </a:xfrm>
+          <a:prstGeom prst="rect">
+            <a:avLst/>
+          </a:prstGeom>
+          <a:noFill/>
+          <a:ln/>
+        </p:spPr>
+        <p:txBody>
+          <a:bodyPr wrap="none" lIns="0" tIns="0" rIns="0" bIns="0" rtlCol="0" anchor="t"/>
+          <a:lstStyle/>
+          <a:p>
+            <a:pPr marL="0" indent="0" algn="ctr">
+              <a:lnSpc>
+                <a:spcPts val="2450"/>
+              </a:lnSpc>
+              <a:buNone/>
+            </a:pPr>
+            <a:r>
+              <a:rPr lang="en-US" sz="2450" dirty="0">
+                <a:solidFill>
+                  <a:srgbClr val="161613"/>
+                </a:solidFill>
+                <a:latin typeface="DM Sans Medium" pitchFamily="34" charset="0"/>
+                <a:ea typeface="DM Sans Medium" pitchFamily="34" charset="-122"/>
+                <a:cs typeface="DM Sans Medium" pitchFamily="34" charset="-120"/>
+              </a:rPr>
+              <a:t>3</a:t>
+            </a:r>
+            <a:endParaRPr lang="en-US" sz="2450" dirty="0"/>
+          </a:p>
+        </p:txBody>
+      </p:sp>
+      <p:sp>
+        <p:nvSpPr>
+          <p:cNvPr id="14" name="Text 11">
+            <a:extLst>
+              <a:ext uri="{FF2B5EF4-FFF2-40B4-BE49-F238E27FC236}">
+                <a16:creationId xmlns:a16="http://schemas.microsoft.com/office/drawing/2014/main" id="{78311FBE-133F-E531-C7CB-BF41A4097A82}"/>
+              </a:ext>
+            </a:extLst>
+          </p:cNvPr>
+          <p:cNvSpPr/>
+          <p:nvPr/>
+        </p:nvSpPr>
+        <p:spPr>
+          <a:xfrm>
+            <a:off x="6911459" y="5047655"/>
+            <a:ext cx="2639258" cy="329922"/>
+          </a:xfrm>
+          <a:prstGeom prst="rect">
+            <a:avLst/>
+          </a:prstGeom>
+          <a:noFill/>
+          <a:ln/>
+        </p:spPr>
+        <p:txBody>
+          <a:bodyPr wrap="none" lIns="0" tIns="0" rIns="0" bIns="0" rtlCol="0" anchor="t"/>
+          <a:lstStyle/>
+          <a:p>
+            <a:pPr marL="0" indent="0" algn="l">
+              <a:lnSpc>
+                <a:spcPts val="2550"/>
+              </a:lnSpc>
+              <a:buNone/>
+            </a:pPr>
+            <a:r>
+              <a:rPr lang="en-US" sz="2050" dirty="0">
+                <a:solidFill>
+                  <a:srgbClr val="161613"/>
+                </a:solidFill>
+                <a:latin typeface="DM Sans Medium" pitchFamily="34" charset="0"/>
+                <a:ea typeface="DM Sans Medium" pitchFamily="34" charset="-122"/>
+                <a:cs typeface="DM Sans Medium" pitchFamily="34" charset="-120"/>
+              </a:rPr>
+              <a:t>Lógica de Negocio</a:t>
+            </a:r>
+            <a:endParaRPr lang="en-US" sz="2050" dirty="0"/>
+          </a:p>
+        </p:txBody>
+      </p:sp>
+      <p:sp>
+        <p:nvSpPr>
+          <p:cNvPr id="15" name="Text 12">
+            <a:extLst>
+              <a:ext uri="{FF2B5EF4-FFF2-40B4-BE49-F238E27FC236}">
+                <a16:creationId xmlns:a16="http://schemas.microsoft.com/office/drawing/2014/main" id="{46AB5E09-9613-9C5A-573C-E736E627D83C}"/>
+              </a:ext>
+            </a:extLst>
+          </p:cNvPr>
+          <p:cNvSpPr/>
+          <p:nvPr/>
+        </p:nvSpPr>
+        <p:spPr>
+          <a:xfrm>
+            <a:off x="6911459" y="5504259"/>
+            <a:ext cx="6980039" cy="337661"/>
+          </a:xfrm>
+          <a:prstGeom prst="rect">
+            <a:avLst/>
+          </a:prstGeom>
+          <a:noFill/>
+          <a:ln/>
+        </p:spPr>
+        <p:txBody>
+          <a:bodyPr wrap="none" lIns="0" tIns="0" rIns="0" bIns="0" rtlCol="0" anchor="t"/>
+          <a:lstStyle/>
+          <a:p>
+            <a:pPr marL="0" indent="0" algn="l">
+              <a:lnSpc>
+                <a:spcPts val="2650"/>
+              </a:lnSpc>
+              <a:buNone/>
+            </a:pPr>
+            <a:r>
+              <a:rPr lang="en-US" sz="1650" dirty="0">
+                <a:solidFill>
+                  <a:srgbClr val="161613"/>
+                </a:solidFill>
+                <a:latin typeface="Inter" pitchFamily="34" charset="0"/>
+                <a:ea typeface="Inter" pitchFamily="34" charset="-122"/>
+                <a:cs typeface="Inter" pitchFamily="34" charset="-120"/>
+              </a:rPr>
+              <a:t>Servicios en C# que implementan reglas y procesos esenciales.</a:t>
+            </a:r>
+            <a:endParaRPr lang="en-US" sz="1650" dirty="0"/>
+          </a:p>
+        </p:txBody>
+      </p:sp>
+      <p:sp>
+        <p:nvSpPr>
+          <p:cNvPr id="16" name="Shape 13">
+            <a:extLst>
+              <a:ext uri="{FF2B5EF4-FFF2-40B4-BE49-F238E27FC236}">
+                <a16:creationId xmlns:a16="http://schemas.microsoft.com/office/drawing/2014/main" id="{F83357C1-1BC4-ED59-AE38-72D6BEE69DE4}"/>
+              </a:ext>
+            </a:extLst>
+          </p:cNvPr>
+          <p:cNvSpPr/>
+          <p:nvPr/>
+        </p:nvSpPr>
+        <p:spPr>
+          <a:xfrm>
+            <a:off x="6225302" y="6264116"/>
+            <a:ext cx="475059" cy="475059"/>
+          </a:xfrm>
+          <a:prstGeom prst="roundRect">
+            <a:avLst>
+              <a:gd name="adj" fmla="val 6667"/>
+            </a:avLst>
+          </a:prstGeom>
+          <a:solidFill>
+            <a:srgbClr val="EDEBE3"/>
+          </a:solidFill>
+          <a:ln/>
+        </p:spPr>
+        <p:txBody>
+          <a:bodyPr/>
+          <a:lstStyle/>
+          <a:p>
+            <a:endParaRPr lang="es-EC"/>
+          </a:p>
+        </p:txBody>
+      </p:sp>
+      <p:sp>
+        <p:nvSpPr>
+          <p:cNvPr id="17" name="Text 14">
+            <a:extLst>
+              <a:ext uri="{FF2B5EF4-FFF2-40B4-BE49-F238E27FC236}">
+                <a16:creationId xmlns:a16="http://schemas.microsoft.com/office/drawing/2014/main" id="{D134AFBA-1086-1C7D-D1FD-5F7CC97A99D1}"/>
+              </a:ext>
+            </a:extLst>
+          </p:cNvPr>
+          <p:cNvSpPr/>
+          <p:nvPr/>
+        </p:nvSpPr>
+        <p:spPr>
+          <a:xfrm>
+            <a:off x="6304478" y="6303705"/>
+            <a:ext cx="316706" cy="395883"/>
+          </a:xfrm>
+          <a:prstGeom prst="rect">
+            <a:avLst/>
+          </a:prstGeom>
+          <a:noFill/>
+          <a:ln/>
+        </p:spPr>
+        <p:txBody>
+          <a:bodyPr wrap="none" lIns="0" tIns="0" rIns="0" bIns="0" rtlCol="0" anchor="t"/>
+          <a:lstStyle/>
+          <a:p>
+            <a:pPr marL="0" indent="0" algn="ctr">
+              <a:lnSpc>
+                <a:spcPts val="2450"/>
+              </a:lnSpc>
+              <a:buNone/>
+            </a:pPr>
+            <a:r>
+              <a:rPr lang="en-US" sz="2450" dirty="0">
+                <a:solidFill>
+                  <a:srgbClr val="161613"/>
+                </a:solidFill>
+                <a:latin typeface="DM Sans Medium" pitchFamily="34" charset="0"/>
+                <a:ea typeface="DM Sans Medium" pitchFamily="34" charset="-122"/>
+                <a:cs typeface="DM Sans Medium" pitchFamily="34" charset="-120"/>
+              </a:rPr>
+              <a:t>4</a:t>
+            </a:r>
+            <a:endParaRPr lang="en-US" sz="2450" dirty="0"/>
+          </a:p>
+        </p:txBody>
+      </p:sp>
+      <p:sp>
+        <p:nvSpPr>
+          <p:cNvPr id="18" name="Text 15">
+            <a:extLst>
+              <a:ext uri="{FF2B5EF4-FFF2-40B4-BE49-F238E27FC236}">
+                <a16:creationId xmlns:a16="http://schemas.microsoft.com/office/drawing/2014/main" id="{6AA13C89-ED34-1AD4-EA29-263C082B70EF}"/>
+              </a:ext>
+            </a:extLst>
+          </p:cNvPr>
+          <p:cNvSpPr/>
+          <p:nvPr/>
+        </p:nvSpPr>
+        <p:spPr>
+          <a:xfrm>
+            <a:off x="6911459" y="6336625"/>
+            <a:ext cx="2639258" cy="329922"/>
+          </a:xfrm>
+          <a:prstGeom prst="rect">
+            <a:avLst/>
+          </a:prstGeom>
+          <a:noFill/>
+          <a:ln/>
+        </p:spPr>
+        <p:txBody>
+          <a:bodyPr wrap="none" lIns="0" tIns="0" rIns="0" bIns="0" rtlCol="0" anchor="t"/>
+          <a:lstStyle/>
+          <a:p>
+            <a:pPr marL="0" indent="0" algn="l">
+              <a:lnSpc>
+                <a:spcPts val="2550"/>
+              </a:lnSpc>
+              <a:buNone/>
+            </a:pPr>
+            <a:r>
+              <a:rPr lang="en-US" sz="2050" dirty="0">
+                <a:solidFill>
+                  <a:srgbClr val="161613"/>
+                </a:solidFill>
+                <a:latin typeface="DM Sans Medium" pitchFamily="34" charset="0"/>
+                <a:ea typeface="DM Sans Medium" pitchFamily="34" charset="-122"/>
+                <a:cs typeface="DM Sans Medium" pitchFamily="34" charset="-120"/>
+              </a:rPr>
+              <a:t>Persistencia</a:t>
+            </a:r>
+            <a:endParaRPr lang="en-US" sz="2050" dirty="0"/>
+          </a:p>
+        </p:txBody>
+      </p:sp>
+      <p:sp>
+        <p:nvSpPr>
+          <p:cNvPr id="19" name="Text 16">
+            <a:extLst>
+              <a:ext uri="{FF2B5EF4-FFF2-40B4-BE49-F238E27FC236}">
+                <a16:creationId xmlns:a16="http://schemas.microsoft.com/office/drawing/2014/main" id="{59336904-712F-4CE2-7111-43100B416F6C}"/>
+              </a:ext>
+            </a:extLst>
+          </p:cNvPr>
+          <p:cNvSpPr/>
+          <p:nvPr/>
+        </p:nvSpPr>
+        <p:spPr>
+          <a:xfrm>
+            <a:off x="6911459" y="6793230"/>
+            <a:ext cx="6980039" cy="675323"/>
+          </a:xfrm>
+          <a:prstGeom prst="rect">
+            <a:avLst/>
+          </a:prstGeom>
+          <a:noFill/>
+          <a:ln/>
+        </p:spPr>
+        <p:txBody>
+          <a:bodyPr wrap="square" lIns="0" tIns="0" rIns="0" bIns="0" rtlCol="0" anchor="t"/>
+          <a:lstStyle/>
+          <a:p>
+            <a:pPr marL="0" indent="0" algn="l">
+              <a:lnSpc>
+                <a:spcPts val="2650"/>
+              </a:lnSpc>
+              <a:buNone/>
+            </a:pPr>
+            <a:r>
+              <a:rPr lang="en-US" sz="1650" dirty="0">
+                <a:solidFill>
+                  <a:srgbClr val="161613"/>
+                </a:solidFill>
+                <a:latin typeface="Inter" pitchFamily="34" charset="0"/>
+                <a:ea typeface="Inter" pitchFamily="34" charset="-122"/>
+                <a:cs typeface="Inter" pitchFamily="34" charset="-120"/>
+              </a:rPr>
+              <a:t>Base de datos PostgreSQL mediante Entity Framework Core para integridad y rendimiento.</a:t>
+            </a:r>
+            <a:endParaRPr lang="en-US" sz="1650" dirty="0"/>
+          </a:p>
+        </p:txBody>
+      </p:sp>
+    </p:spTree>
+    <p:extLst>
+      <p:ext uri="{BB962C8B-B14F-4D97-AF65-F5344CB8AC3E}">
+        <p14:creationId xmlns:p14="http://schemas.microsoft.com/office/powerpoint/2010/main" val="971730288"/>
+      </p:ext>
+    </p:extLst>
   </p:cSld>
   <p:clrMapOvr>
     <a:masterClrMapping/>

</xml_diff>